<commit_message>
fix: rewrite team roles
</commit_message>
<xml_diff>
--- a/presentation (product)/Restobook.pptx
+++ b/presentation (product)/Restobook.pptx
@@ -301,7 +301,7 @@
                   <a:bodyPr/>
                   <a:lstStyle/>
                   <a:p>
-                    <a:fld id="{99EA9911-1DE8-498B-B016-D8E5EFC6C3E8}" type="CELLRANGE">
+                    <a:fld id="{C80F325F-2208-4990-8DD8-103424C40065}" type="CELLRANGE">
                       <a:rPr lang="en-US"/>
                       <a:pPr/>
                       <a:t>[ДИАПАЗОН ЯЧЕЕК]</a:t>
@@ -334,7 +334,7 @@
                   <a:bodyPr/>
                   <a:lstStyle/>
                   <a:p>
-                    <a:fld id="{733BDFAF-1DE3-40FF-AF9B-4CE611169A12}" type="CELLRANGE">
+                    <a:fld id="{10C0C690-5071-4F99-9CCD-C874371BE917}" type="CELLRANGE">
                       <a:rPr lang="ru-RU"/>
                       <a:pPr/>
                       <a:t>[ДИАПАЗОН ЯЧЕЕК]</a:t>
@@ -368,7 +368,7 @@
                   <a:bodyPr/>
                   <a:lstStyle/>
                   <a:p>
-                    <a:fld id="{FD965D9E-A660-4680-A978-1CD7838D2899}" type="CELLRANGE">
+                    <a:fld id="{B88890B0-4243-4615-B6B5-35B14A63DDDE}" type="CELLRANGE">
                       <a:rPr lang="ru-RU"/>
                       <a:pPr/>
                       <a:t>[ДИАПАЗОН ЯЧЕЕК]</a:t>
@@ -402,7 +402,7 @@
                   <a:bodyPr/>
                   <a:lstStyle/>
                   <a:p>
-                    <a:fld id="{892F8A37-75ED-4022-BCE5-B53178DAF175}" type="CELLRANGE">
+                    <a:fld id="{C83B7097-2747-4A53-A84C-8AD62D1F5623}" type="CELLRANGE">
                       <a:rPr lang="ru-RU"/>
                       <a:pPr/>
                       <a:t>[ДИАПАЗОН ЯЧЕЕК]</a:t>
@@ -945,7 +945,7 @@
                   <a:bodyPr/>
                   <a:lstStyle/>
                   <a:p>
-                    <a:fld id="{671EDFF6-9524-4A22-BC25-BCEFB8094365}" type="CELLRANGE">
+                    <a:fld id="{9ED67148-B187-4550-AC6D-E3DC8F1DA668}" type="CELLRANGE">
                       <a:rPr lang="en-US"/>
                       <a:pPr/>
                       <a:t>[ДИАПАЗОН ЯЧЕЕК]</a:t>
@@ -978,7 +978,7 @@
                   <a:bodyPr/>
                   <a:lstStyle/>
                   <a:p>
-                    <a:fld id="{9438EF18-9F1C-488B-88E9-2E66B47DB61B}" type="CELLRANGE">
+                    <a:fld id="{56E06441-869C-4C78-BE52-A6E40DF5EEF2}" type="CELLRANGE">
                       <a:rPr lang="ru-RU"/>
                       <a:pPr/>
                       <a:t>[ДИАПАЗОН ЯЧЕЕК]</a:t>
@@ -2563,7 +2563,7 @@
           <a:p>
             <a:fld id="{90ABE644-5DA6-4F42-9056-5E70F70D6CF2}" type="datetimeFigureOut">
               <a:rPr lang="ru-RU" smtClean="0"/>
-              <a:t>27.05.2024</a:t>
+              <a:t>28.05.2024</a:t>
             </a:fld>
             <a:endParaRPr lang="ru-RU"/>
           </a:p>
@@ -4050,7 +4050,7 @@
           <a:p>
             <a:fld id="{B2D52420-6A92-4DC2-8591-889C8603F9D7}" type="datetime1">
               <a:rPr lang="ru-RU" smtClean="0"/>
-              <a:t>27.05.2024</a:t>
+              <a:t>28.05.2024</a:t>
             </a:fld>
             <a:endParaRPr lang="ru-RU"/>
           </a:p>
@@ -4315,7 +4315,7 @@
           <a:p>
             <a:fld id="{AFC6059B-B3EB-47F3-8BC6-5CF7158CCF5E}" type="datetime1">
               <a:rPr lang="ru-RU" smtClean="0"/>
-              <a:t>27.05.2024</a:t>
+              <a:t>28.05.2024</a:t>
             </a:fld>
             <a:endParaRPr lang="ru-RU"/>
           </a:p>
@@ -4517,7 +4517,7 @@
           <a:p>
             <a:fld id="{672DA8F7-9E1C-4330-89D8-5ACAE3F4BA4B}" type="datetime1">
               <a:rPr lang="ru-RU" smtClean="0"/>
-              <a:t>27.05.2024</a:t>
+              <a:t>28.05.2024</a:t>
             </a:fld>
             <a:endParaRPr lang="ru-RU"/>
           </a:p>
@@ -4719,7 +4719,7 @@
           <a:p>
             <a:fld id="{F4997B83-498B-4930-8185-A988F003D33A}" type="datetime1">
               <a:rPr lang="ru-RU" smtClean="0"/>
-              <a:t>27.05.2024</a:t>
+              <a:t>28.05.2024</a:t>
             </a:fld>
             <a:endParaRPr lang="ru-RU"/>
           </a:p>
@@ -5012,7 +5012,7 @@
           <a:p>
             <a:fld id="{3ABD95BC-C76F-444E-B3FB-BD27E4F798B7}" type="datetime1">
               <a:rPr lang="ru-RU" smtClean="0"/>
-              <a:t>27.05.2024</a:t>
+              <a:t>28.05.2024</a:t>
             </a:fld>
             <a:endParaRPr lang="ru-RU"/>
           </a:p>
@@ -6245,7 +6245,7 @@
           <a:p>
             <a:fld id="{E13DA6AE-AB60-4652-AB2E-D952392D1655}" type="datetime1">
               <a:rPr lang="ru-RU" smtClean="0"/>
-              <a:t>27.05.2024</a:t>
+              <a:t>28.05.2024</a:t>
             </a:fld>
             <a:endParaRPr lang="ru-RU"/>
           </a:p>
@@ -6666,7 +6666,7 @@
           <a:p>
             <a:fld id="{5E0F9A4F-E2CF-4D07-BEAB-A6631996DDD1}" type="datetime1">
               <a:rPr lang="ru-RU" smtClean="0"/>
-              <a:t>27.05.2024</a:t>
+              <a:t>28.05.2024</a:t>
             </a:fld>
             <a:endParaRPr lang="ru-RU"/>
           </a:p>
@@ -6813,7 +6813,7 @@
           <a:p>
             <a:fld id="{06D2A858-6E04-484B-9C45-539F27E3937C}" type="datetime1">
               <a:rPr lang="ru-RU" smtClean="0"/>
-              <a:t>27.05.2024</a:t>
+              <a:t>28.05.2024</a:t>
             </a:fld>
             <a:endParaRPr lang="ru-RU"/>
           </a:p>
@@ -6924,7 +6924,7 @@
           <a:p>
             <a:fld id="{AC6B3F91-F2E8-4402-9B00-8213E0D61D50}" type="datetime1">
               <a:rPr lang="ru-RU" smtClean="0"/>
-              <a:t>27.05.2024</a:t>
+              <a:t>28.05.2024</a:t>
             </a:fld>
             <a:endParaRPr lang="ru-RU"/>
           </a:p>
@@ -7707,7 +7707,7 @@
           <a:p>
             <a:fld id="{50FCF844-36E3-4D2D-9EE0-8615F370CF07}" type="datetime1">
               <a:rPr lang="ru-RU" smtClean="0"/>
-              <a:t>27.05.2024</a:t>
+              <a:t>28.05.2024</a:t>
             </a:fld>
             <a:endParaRPr lang="ru-RU"/>
           </a:p>
@@ -8564,7 +8564,7 @@
           <a:p>
             <a:fld id="{8C256B46-112F-45DA-B602-9179791C6F92}" type="datetime1">
               <a:rPr lang="ru-RU" smtClean="0"/>
-              <a:t>27.05.2024</a:t>
+              <a:t>28.05.2024</a:t>
             </a:fld>
             <a:endParaRPr lang="ru-RU"/>
           </a:p>
@@ -9355,7 +9355,7 @@
           <a:p>
             <a:fld id="{629052EF-D6AA-42E2-9131-813E79594612}" type="datetimeFigureOut">
               <a:rPr lang="ru-RU" smtClean="0"/>
-              <a:t>27.05.2024</a:t>
+              <a:t>28.05.2024</a:t>
             </a:fld>
             <a:endParaRPr lang="ru-RU"/>
           </a:p>
@@ -10602,15 +10602,19 @@
             </a:r>
             <a:r>
               <a:rPr lang="en-US" sz="2400" dirty="0"/>
-              <a:t>- team lead, </a:t>
-            </a:r>
-            <a:r>
-              <a:rPr lang="ru-RU" sz="2400" dirty="0" err="1"/>
-              <a:t>проджект</a:t>
+              <a:t>- team lead</a:t>
+            </a:r>
+            <a:r>
+              <a:rPr lang="en-US" sz="2400"/>
+              <a:t>, PM</a:t>
+            </a:r>
+            <a:r>
+              <a:rPr lang="ru-RU" sz="2400"/>
+              <a:t>, </a:t>
             </a:r>
             <a:r>
               <a:rPr lang="ru-RU" sz="2400" dirty="0"/>
-              <a:t>-менеджер, архитектор, </a:t>
+              <a:t>архитектор, </a:t>
             </a:r>
             <a:r>
               <a:rPr lang="en-US" sz="2400" dirty="0" err="1"/>
@@ -10622,7 +10626,7 @@
             </a:r>
             <a:r>
               <a:rPr lang="ru-RU" sz="2400" dirty="0"/>
-              <a:t>разработчик</a:t>
+              <a:t>разработчик, тестировщик , технический писатель</a:t>
             </a:r>
             <a:endParaRPr lang="en-US" sz="2400" dirty="0"/>
           </a:p>
@@ -10645,8 +10649,9 @@
             </a:r>
             <a:r>
               <a:rPr lang="ru-RU" sz="2400" dirty="0"/>
-              <a:t>аналитик, технический писатель, специалист по продажам, тестировщик</a:t>
-            </a:r>
+              <a:t>аналитик, специалист по продажам</a:t>
+            </a:r>
+            <a:endParaRPr lang="en-US" sz="2400" dirty="0"/>
           </a:p>
           <a:p>
             <a:r>

</xml_diff>

<commit_message>
doc: add notes to slides
</commit_message>
<xml_diff>
--- a/presentation (product)/Restobook.pptx
+++ b/presentation (product)/Restobook.pptx
@@ -357,7 +357,7 @@
                   <a:bodyPr/>
                   <a:lstStyle/>
                   <a:p>
-                    <a:fld id="{5B8C7439-D658-453C-BB52-0366550C053C}" type="CELLRANGE">
+                    <a:fld id="{BFCBF3C2-4038-4447-9FB2-1D68D9810C05}" type="CELLRANGE">
                       <a:rPr lang="en-US"/>
                       <a:pPr/>
                       <a:t>[ДИАПАЗОН ЯЧЕЕК]</a:t>
@@ -390,7 +390,7 @@
                   <a:bodyPr/>
                   <a:lstStyle/>
                   <a:p>
-                    <a:fld id="{8D091715-DD0A-4A66-8B65-3707660E88ED}" type="CELLRANGE">
+                    <a:fld id="{70F51BB1-63D0-4EC9-ABA1-F759F056D57D}" type="CELLRANGE">
                       <a:rPr lang="ru-RU"/>
                       <a:pPr/>
                       <a:t>[ДИАПАЗОН ЯЧЕЕК]</a:t>
@@ -424,7 +424,7 @@
                   <a:bodyPr/>
                   <a:lstStyle/>
                   <a:p>
-                    <a:fld id="{EACB3B71-6843-4FD3-87C7-9B867ED8E07B}" type="CELLRANGE">
+                    <a:fld id="{E71EDC5D-F55A-4ECC-8DC8-41C7F96CF257}" type="CELLRANGE">
                       <a:rPr lang="ru-RU"/>
                       <a:pPr/>
                       <a:t>[ДИАПАЗОН ЯЧЕЕК]</a:t>
@@ -458,7 +458,7 @@
                   <a:bodyPr/>
                   <a:lstStyle/>
                   <a:p>
-                    <a:fld id="{C4D3E0AD-32C5-42B2-BB50-A249E110E549}" type="CELLRANGE">
+                    <a:fld id="{6198A920-F8B2-4A82-AB59-E18BFDDCC846}" type="CELLRANGE">
                       <a:rPr lang="ru-RU"/>
                       <a:pPr/>
                       <a:t>[ДИАПАЗОН ЯЧЕЕК]</a:t>
@@ -1124,7 +1124,7 @@
                   <a:bodyPr/>
                   <a:lstStyle/>
                   <a:p>
-                    <a:fld id="{B7356D29-A884-4747-A0D0-AB25D673BBA0}" type="CELLRANGE">
+                    <a:fld id="{3D1CBAD9-F644-4399-BB32-1F4B1218610A}" type="CELLRANGE">
                       <a:rPr lang="en-US"/>
                       <a:pPr/>
                       <a:t>[ДИАПАЗОН ЯЧЕЕК]</a:t>
@@ -1157,7 +1157,7 @@
                   <a:bodyPr/>
                   <a:lstStyle/>
                   <a:p>
-                    <a:fld id="{D1CA6A48-954C-49D6-B12D-C9B1779FA70A}" type="CELLRANGE">
+                    <a:fld id="{36FE1A57-F61E-4FB3-B956-0C789E6448B5}" type="CELLRANGE">
                       <a:rPr lang="ru-RU"/>
                       <a:pPr/>
                       <a:t>[ДИАПАЗОН ЯЧЕЕК]</a:t>
@@ -1191,7 +1191,7 @@
                   <a:bodyPr/>
                   <a:lstStyle/>
                   <a:p>
-                    <a:fld id="{3761A072-ADD1-45C0-A3EE-FB6C21F4E21C}" type="CELLRANGE">
+                    <a:fld id="{F189EE74-DB45-4E68-AD04-6FBE48D7EA43}" type="CELLRANGE">
                       <a:rPr lang="ru-RU"/>
                       <a:pPr/>
                       <a:t>[ДИАПАЗОН ЯЧЕЕК]</a:t>
@@ -1225,7 +1225,7 @@
                   <a:bodyPr/>
                   <a:lstStyle/>
                   <a:p>
-                    <a:fld id="{29C54476-B42E-4210-AF53-71C3F47D1C7E}" type="CELLRANGE">
+                    <a:fld id="{F3A5DF22-DF41-47D2-B43C-8BEFE9A1FF13}" type="CELLRANGE">
                       <a:rPr lang="ru-RU"/>
                       <a:pPr/>
                       <a:t>[ДИАПАЗОН ЯЧЕЕК]</a:t>
@@ -1686,7 +1686,62 @@
     </mc:Fallback>
   </mc:AlternateContent>
   <c:chart>
-    <c:autoTitleDeleted val="1"/>
+    <c:title>
+      <c:tx>
+        <c:rich>
+          <a:bodyPr rot="0" spcFirstLastPara="1" vertOverflow="ellipsis" vert="horz" wrap="square" anchor="ctr" anchorCtr="1"/>
+          <a:lstStyle/>
+          <a:p>
+            <a:pPr>
+              <a:defRPr sz="1862" b="0" i="0" u="none" strike="noStrike" kern="1200" spc="0" baseline="0">
+                <a:solidFill>
+                  <a:schemeClr val="tx1">
+                    <a:lumMod val="65000"/>
+                    <a:lumOff val="35000"/>
+                  </a:schemeClr>
+                </a:solidFill>
+                <a:latin typeface="+mn-lt"/>
+                <a:ea typeface="+mn-ea"/>
+                <a:cs typeface="+mn-cs"/>
+              </a:defRPr>
+            </a:pPr>
+            <a:r>
+              <a:rPr lang="ru-RU" dirty="0"/>
+              <a:t>Создание брони</a:t>
+            </a:r>
+          </a:p>
+        </c:rich>
+      </c:tx>
+      <c:overlay val="0"/>
+      <c:spPr>
+        <a:noFill/>
+        <a:ln>
+          <a:noFill/>
+        </a:ln>
+        <a:effectLst/>
+      </c:spPr>
+      <c:txPr>
+        <a:bodyPr rot="0" spcFirstLastPara="1" vertOverflow="ellipsis" vert="horz" wrap="square" anchor="ctr" anchorCtr="1"/>
+        <a:lstStyle/>
+        <a:p>
+          <a:pPr>
+            <a:defRPr sz="1862" b="0" i="0" u="none" strike="noStrike" kern="1200" spc="0" baseline="0">
+              <a:solidFill>
+                <a:schemeClr val="tx1">
+                  <a:lumMod val="65000"/>
+                  <a:lumOff val="35000"/>
+                </a:schemeClr>
+              </a:solidFill>
+              <a:latin typeface="+mn-lt"/>
+              <a:ea typeface="+mn-ea"/>
+              <a:cs typeface="+mn-cs"/>
+            </a:defRPr>
+          </a:pPr>
+          <a:endParaRPr lang="ru-RU"/>
+        </a:p>
+      </c:txPr>
+    </c:title>
+    <c:autoTitleDeleted val="0"/>
     <c:plotArea>
       <c:layout/>
       <c:barChart>
@@ -1823,7 +1878,7 @@
                   <a:bodyPr/>
                   <a:lstStyle/>
                   <a:p>
-                    <a:fld id="{A1F1AE9C-A82F-4D40-A55C-10BB48B4FE16}" type="CELLRANGE">
+                    <a:fld id="{D7A934C2-286B-43B4-8F61-D1A1513E1E4D}" type="CELLRANGE">
                       <a:rPr lang="en-US"/>
                       <a:pPr/>
                       <a:t>[ДИАПАЗОН ЯЧЕЕК]</a:t>
@@ -1856,7 +1911,7 @@
                   <a:bodyPr/>
                   <a:lstStyle/>
                   <a:p>
-                    <a:fld id="{1F6B722B-9F21-42A2-9903-6B382A0F9B4B}" type="CELLRANGE">
+                    <a:fld id="{F276E3DB-FA3B-4596-AFFD-EFED53C3C649}" type="CELLRANGE">
                       <a:rPr lang="ru-RU"/>
                       <a:pPr/>
                       <a:t>[ДИАПАЗОН ЯЧЕЕК]</a:t>
@@ -4251,6 +4306,1309 @@
 </p:notesMaster>
 </file>
 
+<file path=ppt/notesSlides/notesSlide1.xml><?xml version="1.0" encoding="utf-8"?>
+<p:notes xmlns:a="http://schemas.openxmlformats.org/drawingml/2006/main" xmlns:r="http://schemas.openxmlformats.org/officeDocument/2006/relationships" xmlns:p="http://schemas.openxmlformats.org/presentationml/2006/main">
+  <p:cSld>
+    <p:spTree>
+      <p:nvGrpSpPr>
+        <p:cNvPr id="1" name=""/>
+        <p:cNvGrpSpPr/>
+        <p:nvPr/>
+      </p:nvGrpSpPr>
+      <p:grpSpPr>
+        <a:xfrm>
+          <a:off x="0" y="0"/>
+          <a:ext cx="0" cy="0"/>
+          <a:chOff x="0" y="0"/>
+          <a:chExt cx="0" cy="0"/>
+        </a:xfrm>
+      </p:grpSpPr>
+      <p:sp>
+        <p:nvSpPr>
+          <p:cNvPr id="2" name="Образ слайда 1"/>
+          <p:cNvSpPr>
+            <a:spLocks noGrp="1" noRot="1" noChangeAspect="1"/>
+          </p:cNvSpPr>
+          <p:nvPr>
+            <p:ph type="sldImg"/>
+          </p:nvPr>
+        </p:nvSpPr>
+        <p:spPr/>
+      </p:sp>
+      <p:sp>
+        <p:nvSpPr>
+          <p:cNvPr id="3" name="Заметки 2"/>
+          <p:cNvSpPr>
+            <a:spLocks noGrp="1"/>
+          </p:cNvSpPr>
+          <p:nvPr>
+            <p:ph type="body" idx="1"/>
+          </p:nvPr>
+        </p:nvSpPr>
+        <p:spPr/>
+        <p:txBody>
+          <a:bodyPr/>
+          <a:lstStyle/>
+          <a:p>
+            <a:endParaRPr lang="ru-RU" dirty="0"/>
+          </a:p>
+        </p:txBody>
+      </p:sp>
+      <p:sp>
+        <p:nvSpPr>
+          <p:cNvPr id="4" name="Номер слайда 3"/>
+          <p:cNvSpPr>
+            <a:spLocks noGrp="1"/>
+          </p:cNvSpPr>
+          <p:nvPr>
+            <p:ph type="sldNum" sz="quarter" idx="5"/>
+          </p:nvPr>
+        </p:nvSpPr>
+        <p:spPr/>
+        <p:txBody>
+          <a:bodyPr/>
+          <a:lstStyle/>
+          <a:p>
+            <a:fld id="{6D5D9A67-3DE5-459E-8D3F-A02553138B9D}" type="slidenum">
+              <a:rPr lang="ru-RU" smtClean="0"/>
+              <a:t>1</a:t>
+            </a:fld>
+            <a:endParaRPr lang="ru-RU"/>
+          </a:p>
+        </p:txBody>
+      </p:sp>
+    </p:spTree>
+    <p:extLst>
+      <p:ext uri="{BB962C8B-B14F-4D97-AF65-F5344CB8AC3E}">
+        <p14:creationId xmlns:p14="http://schemas.microsoft.com/office/powerpoint/2010/main" val="4175766876"/>
+      </p:ext>
+    </p:extLst>
+  </p:cSld>
+  <p:clrMapOvr>
+    <a:masterClrMapping/>
+  </p:clrMapOvr>
+</p:notes>
+</file>
+
+<file path=ppt/notesSlides/notesSlide10.xml><?xml version="1.0" encoding="utf-8"?>
+<p:notes xmlns:a="http://schemas.openxmlformats.org/drawingml/2006/main" xmlns:r="http://schemas.openxmlformats.org/officeDocument/2006/relationships" xmlns:p="http://schemas.openxmlformats.org/presentationml/2006/main">
+  <p:cSld>
+    <p:spTree>
+      <p:nvGrpSpPr>
+        <p:cNvPr id="1" name=""/>
+        <p:cNvGrpSpPr/>
+        <p:nvPr/>
+      </p:nvGrpSpPr>
+      <p:grpSpPr>
+        <a:xfrm>
+          <a:off x="0" y="0"/>
+          <a:ext cx="0" cy="0"/>
+          <a:chOff x="0" y="0"/>
+          <a:chExt cx="0" cy="0"/>
+        </a:xfrm>
+      </p:grpSpPr>
+      <p:sp>
+        <p:nvSpPr>
+          <p:cNvPr id="2" name="Образ слайда 1"/>
+          <p:cNvSpPr>
+            <a:spLocks noGrp="1" noRot="1" noChangeAspect="1"/>
+          </p:cNvSpPr>
+          <p:nvPr>
+            <p:ph type="sldImg"/>
+          </p:nvPr>
+        </p:nvSpPr>
+        <p:spPr/>
+      </p:sp>
+      <p:sp>
+        <p:nvSpPr>
+          <p:cNvPr id="3" name="Заметки 2"/>
+          <p:cNvSpPr>
+            <a:spLocks noGrp="1"/>
+          </p:cNvSpPr>
+          <p:nvPr>
+            <p:ph type="body" idx="1"/>
+          </p:nvPr>
+        </p:nvSpPr>
+        <p:spPr/>
+        <p:txBody>
+          <a:bodyPr/>
+          <a:lstStyle/>
+          <a:p>
+            <a:r>
+              <a:rPr lang="ru-RU" dirty="0"/>
+              <a:t>У конкурентов минимальная подписка – 1100 рублей в месяц</a:t>
+            </a:r>
+          </a:p>
+          <a:p>
+            <a:r>
+              <a:rPr lang="ru-RU" dirty="0"/>
+              <a:t>У нас – 750!</a:t>
+            </a:r>
+          </a:p>
+          <a:p>
+            <a:r>
+              <a:rPr lang="ru-RU" dirty="0"/>
+              <a:t>Покрывают расходы на хостинг</a:t>
+            </a:r>
+          </a:p>
+        </p:txBody>
+      </p:sp>
+      <p:sp>
+        <p:nvSpPr>
+          <p:cNvPr id="4" name="Номер слайда 3"/>
+          <p:cNvSpPr>
+            <a:spLocks noGrp="1"/>
+          </p:cNvSpPr>
+          <p:nvPr>
+            <p:ph type="sldNum" sz="quarter" idx="5"/>
+          </p:nvPr>
+        </p:nvSpPr>
+        <p:spPr/>
+        <p:txBody>
+          <a:bodyPr/>
+          <a:lstStyle/>
+          <a:p>
+            <a:fld id="{6D5D9A67-3DE5-459E-8D3F-A02553138B9D}" type="slidenum">
+              <a:rPr lang="ru-RU" smtClean="0"/>
+              <a:t>10</a:t>
+            </a:fld>
+            <a:endParaRPr lang="ru-RU"/>
+          </a:p>
+        </p:txBody>
+      </p:sp>
+    </p:spTree>
+    <p:extLst>
+      <p:ext uri="{BB962C8B-B14F-4D97-AF65-F5344CB8AC3E}">
+        <p14:creationId xmlns:p14="http://schemas.microsoft.com/office/powerpoint/2010/main" val="716624520"/>
+      </p:ext>
+    </p:extLst>
+  </p:cSld>
+  <p:clrMapOvr>
+    <a:masterClrMapping/>
+  </p:clrMapOvr>
+</p:notes>
+</file>
+
+<file path=ppt/notesSlides/notesSlide11.xml><?xml version="1.0" encoding="utf-8"?>
+<p:notes xmlns:a="http://schemas.openxmlformats.org/drawingml/2006/main" xmlns:r="http://schemas.openxmlformats.org/officeDocument/2006/relationships" xmlns:p="http://schemas.openxmlformats.org/presentationml/2006/main">
+  <p:cSld>
+    <p:spTree>
+      <p:nvGrpSpPr>
+        <p:cNvPr id="1" name=""/>
+        <p:cNvGrpSpPr/>
+        <p:nvPr/>
+      </p:nvGrpSpPr>
+      <p:grpSpPr>
+        <a:xfrm>
+          <a:off x="0" y="0"/>
+          <a:ext cx="0" cy="0"/>
+          <a:chOff x="0" y="0"/>
+          <a:chExt cx="0" cy="0"/>
+        </a:xfrm>
+      </p:grpSpPr>
+      <p:sp>
+        <p:nvSpPr>
+          <p:cNvPr id="2" name="Образ слайда 1"/>
+          <p:cNvSpPr>
+            <a:spLocks noGrp="1" noRot="1" noChangeAspect="1"/>
+          </p:cNvSpPr>
+          <p:nvPr>
+            <p:ph type="sldImg"/>
+          </p:nvPr>
+        </p:nvSpPr>
+        <p:spPr/>
+      </p:sp>
+      <p:sp>
+        <p:nvSpPr>
+          <p:cNvPr id="3" name="Заметки 2"/>
+          <p:cNvSpPr>
+            <a:spLocks noGrp="1"/>
+          </p:cNvSpPr>
+          <p:nvPr>
+            <p:ph type="body" idx="1"/>
+          </p:nvPr>
+        </p:nvSpPr>
+        <p:spPr/>
+        <p:txBody>
+          <a:bodyPr/>
+          <a:lstStyle/>
+          <a:p>
+            <a:r>
+              <a:rPr lang="ru-RU" dirty="0"/>
+              <a:t>Популярные технологии</a:t>
+            </a:r>
+          </a:p>
+        </p:txBody>
+      </p:sp>
+      <p:sp>
+        <p:nvSpPr>
+          <p:cNvPr id="4" name="Номер слайда 3"/>
+          <p:cNvSpPr>
+            <a:spLocks noGrp="1"/>
+          </p:cNvSpPr>
+          <p:nvPr>
+            <p:ph type="sldNum" sz="quarter" idx="5"/>
+          </p:nvPr>
+        </p:nvSpPr>
+        <p:spPr/>
+        <p:txBody>
+          <a:bodyPr/>
+          <a:lstStyle/>
+          <a:p>
+            <a:fld id="{6D5D9A67-3DE5-459E-8D3F-A02553138B9D}" type="slidenum">
+              <a:rPr lang="ru-RU" smtClean="0"/>
+              <a:t>11</a:t>
+            </a:fld>
+            <a:endParaRPr lang="ru-RU"/>
+          </a:p>
+        </p:txBody>
+      </p:sp>
+    </p:spTree>
+    <p:extLst>
+      <p:ext uri="{BB962C8B-B14F-4D97-AF65-F5344CB8AC3E}">
+        <p14:creationId xmlns:p14="http://schemas.microsoft.com/office/powerpoint/2010/main" val="388829164"/>
+      </p:ext>
+    </p:extLst>
+  </p:cSld>
+  <p:clrMapOvr>
+    <a:masterClrMapping/>
+  </p:clrMapOvr>
+</p:notes>
+</file>
+
+<file path=ppt/notesSlides/notesSlide12.xml><?xml version="1.0" encoding="utf-8"?>
+<p:notes xmlns:a="http://schemas.openxmlformats.org/drawingml/2006/main" xmlns:r="http://schemas.openxmlformats.org/officeDocument/2006/relationships" xmlns:p="http://schemas.openxmlformats.org/presentationml/2006/main">
+  <p:cSld>
+    <p:spTree>
+      <p:nvGrpSpPr>
+        <p:cNvPr id="1" name=""/>
+        <p:cNvGrpSpPr/>
+        <p:nvPr/>
+      </p:nvGrpSpPr>
+      <p:grpSpPr>
+        <a:xfrm>
+          <a:off x="0" y="0"/>
+          <a:ext cx="0" cy="0"/>
+          <a:chOff x="0" y="0"/>
+          <a:chExt cx="0" cy="0"/>
+        </a:xfrm>
+      </p:grpSpPr>
+      <p:sp>
+        <p:nvSpPr>
+          <p:cNvPr id="2" name="Образ слайда 1"/>
+          <p:cNvSpPr>
+            <a:spLocks noGrp="1" noRot="1" noChangeAspect="1"/>
+          </p:cNvSpPr>
+          <p:nvPr>
+            <p:ph type="sldImg"/>
+          </p:nvPr>
+        </p:nvSpPr>
+        <p:spPr/>
+      </p:sp>
+      <p:sp>
+        <p:nvSpPr>
+          <p:cNvPr id="3" name="Заметки 2"/>
+          <p:cNvSpPr>
+            <a:spLocks noGrp="1"/>
+          </p:cNvSpPr>
+          <p:nvPr>
+            <p:ph type="body" idx="1"/>
+          </p:nvPr>
+        </p:nvSpPr>
+        <p:spPr/>
+        <p:txBody>
+          <a:bodyPr/>
+          <a:lstStyle/>
+          <a:p>
+            <a:r>
+              <a:rPr lang="ru-RU" dirty="0"/>
+              <a:t>Расширение функциональности приложения</a:t>
+            </a:r>
+          </a:p>
+          <a:p>
+            <a:r>
+              <a:rPr lang="ru-RU" dirty="0"/>
+              <a:t>В долгосрочной перспективе</a:t>
+            </a:r>
+          </a:p>
+          <a:p>
+            <a:r>
+              <a:rPr lang="ru-RU" dirty="0"/>
+              <a:t>Визуализация столов</a:t>
+            </a:r>
+          </a:p>
+          <a:p>
+            <a:r>
+              <a:rPr lang="ru-RU" dirty="0"/>
+              <a:t>Аналитика броней и гостей</a:t>
+            </a:r>
+          </a:p>
+          <a:p>
+            <a:r>
+              <a:rPr lang="ru-RU" dirty="0"/>
+              <a:t>Интеграция с сервисом автоматизации ресторанов </a:t>
+            </a:r>
+            <a:r>
+              <a:rPr lang="ru-RU" dirty="0" err="1"/>
+              <a:t>Айко</a:t>
+            </a:r>
+            <a:endParaRPr lang="ru-RU" dirty="0"/>
+          </a:p>
+          <a:p>
+            <a:endParaRPr lang="ru-RU" dirty="0"/>
+          </a:p>
+        </p:txBody>
+      </p:sp>
+      <p:sp>
+        <p:nvSpPr>
+          <p:cNvPr id="4" name="Номер слайда 3"/>
+          <p:cNvSpPr>
+            <a:spLocks noGrp="1"/>
+          </p:cNvSpPr>
+          <p:nvPr>
+            <p:ph type="sldNum" sz="quarter" idx="5"/>
+          </p:nvPr>
+        </p:nvSpPr>
+        <p:spPr/>
+        <p:txBody>
+          <a:bodyPr/>
+          <a:lstStyle/>
+          <a:p>
+            <a:fld id="{6D5D9A67-3DE5-459E-8D3F-A02553138B9D}" type="slidenum">
+              <a:rPr lang="ru-RU" smtClean="0"/>
+              <a:t>12</a:t>
+            </a:fld>
+            <a:endParaRPr lang="ru-RU"/>
+          </a:p>
+        </p:txBody>
+      </p:sp>
+    </p:spTree>
+    <p:extLst>
+      <p:ext uri="{BB962C8B-B14F-4D97-AF65-F5344CB8AC3E}">
+        <p14:creationId xmlns:p14="http://schemas.microsoft.com/office/powerpoint/2010/main" val="558800599"/>
+      </p:ext>
+    </p:extLst>
+  </p:cSld>
+  <p:clrMapOvr>
+    <a:masterClrMapping/>
+  </p:clrMapOvr>
+</p:notes>
+</file>
+
+<file path=ppt/notesSlides/notesSlide13.xml><?xml version="1.0" encoding="utf-8"?>
+<p:notes xmlns:a="http://schemas.openxmlformats.org/drawingml/2006/main" xmlns:r="http://schemas.openxmlformats.org/officeDocument/2006/relationships" xmlns:p="http://schemas.openxmlformats.org/presentationml/2006/main">
+  <p:cSld>
+    <p:spTree>
+      <p:nvGrpSpPr>
+        <p:cNvPr id="1" name=""/>
+        <p:cNvGrpSpPr/>
+        <p:nvPr/>
+      </p:nvGrpSpPr>
+      <p:grpSpPr>
+        <a:xfrm>
+          <a:off x="0" y="0"/>
+          <a:ext cx="0" cy="0"/>
+          <a:chOff x="0" y="0"/>
+          <a:chExt cx="0" cy="0"/>
+        </a:xfrm>
+      </p:grpSpPr>
+      <p:sp>
+        <p:nvSpPr>
+          <p:cNvPr id="2" name="Образ слайда 1"/>
+          <p:cNvSpPr>
+            <a:spLocks noGrp="1" noRot="1" noChangeAspect="1"/>
+          </p:cNvSpPr>
+          <p:nvPr>
+            <p:ph type="sldImg"/>
+          </p:nvPr>
+        </p:nvSpPr>
+        <p:spPr/>
+      </p:sp>
+      <p:sp>
+        <p:nvSpPr>
+          <p:cNvPr id="3" name="Заметки 2"/>
+          <p:cNvSpPr>
+            <a:spLocks noGrp="1"/>
+          </p:cNvSpPr>
+          <p:nvPr>
+            <p:ph type="body" idx="1"/>
+          </p:nvPr>
+        </p:nvSpPr>
+        <p:spPr/>
+        <p:txBody>
+          <a:bodyPr/>
+          <a:lstStyle/>
+          <a:p>
+            <a:r>
+              <a:rPr lang="ru-RU" dirty="0"/>
+              <a:t>Путин Павел Александрович</a:t>
+            </a:r>
+          </a:p>
+          <a:p>
+            <a:r>
+              <a:rPr lang="ru-RU" dirty="0"/>
+              <a:t>Ефремов Михаил Витальевич</a:t>
+            </a:r>
+          </a:p>
+          <a:p>
+            <a:r>
+              <a:rPr lang="ru-RU" dirty="0" err="1"/>
+              <a:t>Насайр</a:t>
+            </a:r>
+            <a:r>
+              <a:rPr lang="ru-RU" dirty="0"/>
+              <a:t> Марьям </a:t>
+            </a:r>
+            <a:r>
+              <a:rPr lang="ru-RU" dirty="0" err="1"/>
+              <a:t>Магди</a:t>
+            </a:r>
+            <a:r>
+              <a:rPr lang="ru-RU" dirty="0"/>
+              <a:t> Захи</a:t>
+            </a:r>
+          </a:p>
+          <a:p>
+            <a:r>
+              <a:rPr lang="ru-RU" dirty="0"/>
+              <a:t>Ноэль </a:t>
+            </a:r>
+            <a:r>
+              <a:rPr lang="ru-RU" dirty="0" err="1"/>
+              <a:t>Жулмист</a:t>
+            </a:r>
+            <a:r>
+              <a:rPr lang="ru-RU" dirty="0"/>
+              <a:t> Филс</a:t>
+            </a:r>
+          </a:p>
+        </p:txBody>
+      </p:sp>
+      <p:sp>
+        <p:nvSpPr>
+          <p:cNvPr id="4" name="Номер слайда 3"/>
+          <p:cNvSpPr>
+            <a:spLocks noGrp="1"/>
+          </p:cNvSpPr>
+          <p:nvPr>
+            <p:ph type="sldNum" sz="quarter" idx="5"/>
+          </p:nvPr>
+        </p:nvSpPr>
+        <p:spPr/>
+        <p:txBody>
+          <a:bodyPr/>
+          <a:lstStyle/>
+          <a:p>
+            <a:fld id="{6D5D9A67-3DE5-459E-8D3F-A02553138B9D}" type="slidenum">
+              <a:rPr lang="ru-RU" smtClean="0"/>
+              <a:t>13</a:t>
+            </a:fld>
+            <a:endParaRPr lang="ru-RU"/>
+          </a:p>
+        </p:txBody>
+      </p:sp>
+    </p:spTree>
+    <p:extLst>
+      <p:ext uri="{BB962C8B-B14F-4D97-AF65-F5344CB8AC3E}">
+        <p14:creationId xmlns:p14="http://schemas.microsoft.com/office/powerpoint/2010/main" val="3457706466"/>
+      </p:ext>
+    </p:extLst>
+  </p:cSld>
+  <p:clrMapOvr>
+    <a:masterClrMapping/>
+  </p:clrMapOvr>
+</p:notes>
+</file>
+
+<file path=ppt/notesSlides/notesSlide2.xml><?xml version="1.0" encoding="utf-8"?>
+<p:notes xmlns:a="http://schemas.openxmlformats.org/drawingml/2006/main" xmlns:r="http://schemas.openxmlformats.org/officeDocument/2006/relationships" xmlns:p="http://schemas.openxmlformats.org/presentationml/2006/main">
+  <p:cSld>
+    <p:spTree>
+      <p:nvGrpSpPr>
+        <p:cNvPr id="1" name=""/>
+        <p:cNvGrpSpPr/>
+        <p:nvPr/>
+      </p:nvGrpSpPr>
+      <p:grpSpPr>
+        <a:xfrm>
+          <a:off x="0" y="0"/>
+          <a:ext cx="0" cy="0"/>
+          <a:chOff x="0" y="0"/>
+          <a:chExt cx="0" cy="0"/>
+        </a:xfrm>
+      </p:grpSpPr>
+      <p:sp>
+        <p:nvSpPr>
+          <p:cNvPr id="2" name="Образ слайда 1"/>
+          <p:cNvSpPr>
+            <a:spLocks noGrp="1" noRot="1" noChangeAspect="1"/>
+          </p:cNvSpPr>
+          <p:nvPr>
+            <p:ph type="sldImg"/>
+          </p:nvPr>
+        </p:nvSpPr>
+        <p:spPr/>
+      </p:sp>
+      <p:sp>
+        <p:nvSpPr>
+          <p:cNvPr id="3" name="Заметки 2"/>
+          <p:cNvSpPr>
+            <a:spLocks noGrp="1"/>
+          </p:cNvSpPr>
+          <p:nvPr>
+            <p:ph type="body" idx="1"/>
+          </p:nvPr>
+        </p:nvSpPr>
+        <p:spPr/>
+        <p:txBody>
+          <a:bodyPr/>
+          <a:lstStyle/>
+          <a:p>
+            <a:r>
+              <a:rPr lang="ru-RU" dirty="0"/>
+              <a:t>Исследование </a:t>
+            </a:r>
+            <a:r>
+              <a:rPr lang="en-US" dirty="0" err="1"/>
+              <a:t>Busines</a:t>
+            </a:r>
+            <a:r>
+              <a:rPr lang="en-US" dirty="0"/>
+              <a:t> Stat</a:t>
+            </a:r>
+            <a:endParaRPr lang="ru-RU" dirty="0"/>
+          </a:p>
+          <a:p>
+            <a:r>
+              <a:rPr lang="ru-RU" dirty="0"/>
+              <a:t>Оборот рынка за 5 лет в России</a:t>
+            </a:r>
+          </a:p>
+          <a:p>
+            <a:r>
+              <a:rPr lang="ru-RU" dirty="0"/>
+              <a:t>В 2 раза! 2 триллиона 800 миллионов рублей</a:t>
+            </a:r>
+          </a:p>
+          <a:p>
+            <a:r>
+              <a:rPr lang="ru-RU" dirty="0"/>
+              <a:t>Продолжает расти!</a:t>
+            </a:r>
+          </a:p>
+        </p:txBody>
+      </p:sp>
+      <p:sp>
+        <p:nvSpPr>
+          <p:cNvPr id="4" name="Номер слайда 3"/>
+          <p:cNvSpPr>
+            <a:spLocks noGrp="1"/>
+          </p:cNvSpPr>
+          <p:nvPr>
+            <p:ph type="sldNum" sz="quarter" idx="5"/>
+          </p:nvPr>
+        </p:nvSpPr>
+        <p:spPr/>
+        <p:txBody>
+          <a:bodyPr/>
+          <a:lstStyle/>
+          <a:p>
+            <a:fld id="{6D5D9A67-3DE5-459E-8D3F-A02553138B9D}" type="slidenum">
+              <a:rPr lang="ru-RU" smtClean="0"/>
+              <a:t>2</a:t>
+            </a:fld>
+            <a:endParaRPr lang="ru-RU"/>
+          </a:p>
+        </p:txBody>
+      </p:sp>
+    </p:spTree>
+    <p:extLst>
+      <p:ext uri="{BB962C8B-B14F-4D97-AF65-F5344CB8AC3E}">
+        <p14:creationId xmlns:p14="http://schemas.microsoft.com/office/powerpoint/2010/main" val="2669851248"/>
+      </p:ext>
+    </p:extLst>
+  </p:cSld>
+  <p:clrMapOvr>
+    <a:masterClrMapping/>
+  </p:clrMapOvr>
+</p:notes>
+</file>
+
+<file path=ppt/notesSlides/notesSlide3.xml><?xml version="1.0" encoding="utf-8"?>
+<p:notes xmlns:a="http://schemas.openxmlformats.org/drawingml/2006/main" xmlns:r="http://schemas.openxmlformats.org/officeDocument/2006/relationships" xmlns:p="http://schemas.openxmlformats.org/presentationml/2006/main">
+  <p:cSld>
+    <p:spTree>
+      <p:nvGrpSpPr>
+        <p:cNvPr id="1" name=""/>
+        <p:cNvGrpSpPr/>
+        <p:nvPr/>
+      </p:nvGrpSpPr>
+      <p:grpSpPr>
+        <a:xfrm>
+          <a:off x="0" y="0"/>
+          <a:ext cx="0" cy="0"/>
+          <a:chOff x="0" y="0"/>
+          <a:chExt cx="0" cy="0"/>
+        </a:xfrm>
+      </p:grpSpPr>
+      <p:sp>
+        <p:nvSpPr>
+          <p:cNvPr id="2" name="Образ слайда 1"/>
+          <p:cNvSpPr>
+            <a:spLocks noGrp="1" noRot="1" noChangeAspect="1"/>
+          </p:cNvSpPr>
+          <p:nvPr>
+            <p:ph type="sldImg"/>
+          </p:nvPr>
+        </p:nvSpPr>
+        <p:spPr/>
+      </p:sp>
+      <p:sp>
+        <p:nvSpPr>
+          <p:cNvPr id="3" name="Заметки 2"/>
+          <p:cNvSpPr>
+            <a:spLocks noGrp="1"/>
+          </p:cNvSpPr>
+          <p:nvPr>
+            <p:ph type="body" idx="1"/>
+          </p:nvPr>
+        </p:nvSpPr>
+        <p:spPr/>
+        <p:txBody>
+          <a:bodyPr/>
+          <a:lstStyle/>
+          <a:p>
+            <a:r>
+              <a:rPr lang="ru-RU" dirty="0"/>
+              <a:t>Количество потребителей 123 миллиона человек</a:t>
+            </a:r>
+          </a:p>
+          <a:p>
+            <a:r>
+              <a:rPr lang="ru-RU" dirty="0"/>
+              <a:t>Превысил доковидный показатель</a:t>
+            </a:r>
+          </a:p>
+          <a:p>
+            <a:endParaRPr lang="ru-RU" dirty="0"/>
+          </a:p>
+        </p:txBody>
+      </p:sp>
+      <p:sp>
+        <p:nvSpPr>
+          <p:cNvPr id="4" name="Номер слайда 3"/>
+          <p:cNvSpPr>
+            <a:spLocks noGrp="1"/>
+          </p:cNvSpPr>
+          <p:nvPr>
+            <p:ph type="sldNum" sz="quarter" idx="5"/>
+          </p:nvPr>
+        </p:nvSpPr>
+        <p:spPr/>
+        <p:txBody>
+          <a:bodyPr/>
+          <a:lstStyle/>
+          <a:p>
+            <a:fld id="{6D5D9A67-3DE5-459E-8D3F-A02553138B9D}" type="slidenum">
+              <a:rPr lang="ru-RU" smtClean="0"/>
+              <a:t>3</a:t>
+            </a:fld>
+            <a:endParaRPr lang="ru-RU"/>
+          </a:p>
+        </p:txBody>
+      </p:sp>
+    </p:spTree>
+    <p:extLst>
+      <p:ext uri="{BB962C8B-B14F-4D97-AF65-F5344CB8AC3E}">
+        <p14:creationId xmlns:p14="http://schemas.microsoft.com/office/powerpoint/2010/main" val="1241120320"/>
+      </p:ext>
+    </p:extLst>
+  </p:cSld>
+  <p:clrMapOvr>
+    <a:masterClrMapping/>
+  </p:clrMapOvr>
+</p:notes>
+</file>
+
+<file path=ppt/notesSlides/notesSlide4.xml><?xml version="1.0" encoding="utf-8"?>
+<p:notes xmlns:a="http://schemas.openxmlformats.org/drawingml/2006/main" xmlns:r="http://schemas.openxmlformats.org/officeDocument/2006/relationships" xmlns:p="http://schemas.openxmlformats.org/presentationml/2006/main">
+  <p:cSld>
+    <p:spTree>
+      <p:nvGrpSpPr>
+        <p:cNvPr id="1" name=""/>
+        <p:cNvGrpSpPr/>
+        <p:nvPr/>
+      </p:nvGrpSpPr>
+      <p:grpSpPr>
+        <a:xfrm>
+          <a:off x="0" y="0"/>
+          <a:ext cx="0" cy="0"/>
+          <a:chOff x="0" y="0"/>
+          <a:chExt cx="0" cy="0"/>
+        </a:xfrm>
+      </p:grpSpPr>
+      <p:sp>
+        <p:nvSpPr>
+          <p:cNvPr id="2" name="Образ слайда 1"/>
+          <p:cNvSpPr>
+            <a:spLocks noGrp="1" noRot="1" noChangeAspect="1"/>
+          </p:cNvSpPr>
+          <p:nvPr>
+            <p:ph type="sldImg"/>
+          </p:nvPr>
+        </p:nvSpPr>
+        <p:spPr/>
+      </p:sp>
+      <p:sp>
+        <p:nvSpPr>
+          <p:cNvPr id="3" name="Заметки 2"/>
+          <p:cNvSpPr>
+            <a:spLocks noGrp="1"/>
+          </p:cNvSpPr>
+          <p:nvPr>
+            <p:ph type="body" idx="1"/>
+          </p:nvPr>
+        </p:nvSpPr>
+        <p:spPr/>
+        <p:txBody>
+          <a:bodyPr/>
+          <a:lstStyle/>
+          <a:p>
+            <a:r>
+              <a:rPr lang="ru-RU" dirty="0"/>
+              <a:t>Бумажная книга резервов – неудобно</a:t>
+            </a:r>
+          </a:p>
+          <a:p>
+            <a:r>
+              <a:rPr lang="ru-RU" dirty="0"/>
+              <a:t>Трудно синхронизировать между сотрудниками</a:t>
+            </a:r>
+          </a:p>
+          <a:p>
+            <a:r>
+              <a:rPr lang="ru-RU" dirty="0"/>
+              <a:t>Портиться опыт посетителей</a:t>
+            </a:r>
+          </a:p>
+        </p:txBody>
+      </p:sp>
+      <p:sp>
+        <p:nvSpPr>
+          <p:cNvPr id="4" name="Номер слайда 3"/>
+          <p:cNvSpPr>
+            <a:spLocks noGrp="1"/>
+          </p:cNvSpPr>
+          <p:nvPr>
+            <p:ph type="sldNum" sz="quarter" idx="5"/>
+          </p:nvPr>
+        </p:nvSpPr>
+        <p:spPr/>
+        <p:txBody>
+          <a:bodyPr/>
+          <a:lstStyle/>
+          <a:p>
+            <a:fld id="{6D5D9A67-3DE5-459E-8D3F-A02553138B9D}" type="slidenum">
+              <a:rPr lang="ru-RU" smtClean="0"/>
+              <a:t>4</a:t>
+            </a:fld>
+            <a:endParaRPr lang="ru-RU"/>
+          </a:p>
+        </p:txBody>
+      </p:sp>
+    </p:spTree>
+    <p:extLst>
+      <p:ext uri="{BB962C8B-B14F-4D97-AF65-F5344CB8AC3E}">
+        <p14:creationId xmlns:p14="http://schemas.microsoft.com/office/powerpoint/2010/main" val="173523748"/>
+      </p:ext>
+    </p:extLst>
+  </p:cSld>
+  <p:clrMapOvr>
+    <a:masterClrMapping/>
+  </p:clrMapOvr>
+</p:notes>
+</file>
+
+<file path=ppt/notesSlides/notesSlide5.xml><?xml version="1.0" encoding="utf-8"?>
+<p:notes xmlns:a="http://schemas.openxmlformats.org/drawingml/2006/main" xmlns:r="http://schemas.openxmlformats.org/officeDocument/2006/relationships" xmlns:p="http://schemas.openxmlformats.org/presentationml/2006/main">
+  <p:cSld>
+    <p:spTree>
+      <p:nvGrpSpPr>
+        <p:cNvPr id="1" name=""/>
+        <p:cNvGrpSpPr/>
+        <p:nvPr/>
+      </p:nvGrpSpPr>
+      <p:grpSpPr>
+        <a:xfrm>
+          <a:off x="0" y="0"/>
+          <a:ext cx="0" cy="0"/>
+          <a:chOff x="0" y="0"/>
+          <a:chExt cx="0" cy="0"/>
+        </a:xfrm>
+      </p:grpSpPr>
+      <p:sp>
+        <p:nvSpPr>
+          <p:cNvPr id="2" name="Образ слайда 1"/>
+          <p:cNvSpPr>
+            <a:spLocks noGrp="1" noRot="1" noChangeAspect="1"/>
+          </p:cNvSpPr>
+          <p:nvPr>
+            <p:ph type="sldImg"/>
+          </p:nvPr>
+        </p:nvSpPr>
+        <p:spPr/>
+      </p:sp>
+      <p:sp>
+        <p:nvSpPr>
+          <p:cNvPr id="3" name="Заметки 2"/>
+          <p:cNvSpPr>
+            <a:spLocks noGrp="1"/>
+          </p:cNvSpPr>
+          <p:nvPr>
+            <p:ph type="body" idx="1"/>
+          </p:nvPr>
+        </p:nvSpPr>
+        <p:spPr/>
+        <p:txBody>
+          <a:bodyPr/>
+          <a:lstStyle/>
+          <a:p>
+            <a:r>
+              <a:rPr lang="ru-RU" dirty="0"/>
+              <a:t>Средние рестораны</a:t>
+            </a:r>
+          </a:p>
+          <a:p>
+            <a:r>
+              <a:rPr lang="ru-RU" dirty="0"/>
+              <a:t>До 100 человек в день</a:t>
+            </a:r>
+          </a:p>
+          <a:p>
+            <a:r>
+              <a:rPr lang="ru-RU" dirty="0"/>
+              <a:t>Не готовы платить за дорогие и сложные решения</a:t>
+            </a:r>
+          </a:p>
+        </p:txBody>
+      </p:sp>
+      <p:sp>
+        <p:nvSpPr>
+          <p:cNvPr id="4" name="Номер слайда 3"/>
+          <p:cNvSpPr>
+            <a:spLocks noGrp="1"/>
+          </p:cNvSpPr>
+          <p:nvPr>
+            <p:ph type="sldNum" sz="quarter" idx="5"/>
+          </p:nvPr>
+        </p:nvSpPr>
+        <p:spPr/>
+        <p:txBody>
+          <a:bodyPr/>
+          <a:lstStyle/>
+          <a:p>
+            <a:fld id="{6D5D9A67-3DE5-459E-8D3F-A02553138B9D}" type="slidenum">
+              <a:rPr lang="ru-RU" smtClean="0"/>
+              <a:t>5</a:t>
+            </a:fld>
+            <a:endParaRPr lang="ru-RU"/>
+          </a:p>
+        </p:txBody>
+      </p:sp>
+    </p:spTree>
+    <p:extLst>
+      <p:ext uri="{BB962C8B-B14F-4D97-AF65-F5344CB8AC3E}">
+        <p14:creationId xmlns:p14="http://schemas.microsoft.com/office/powerpoint/2010/main" val="1018907147"/>
+      </p:ext>
+    </p:extLst>
+  </p:cSld>
+  <p:clrMapOvr>
+    <a:masterClrMapping/>
+  </p:clrMapOvr>
+</p:notes>
+</file>
+
+<file path=ppt/notesSlides/notesSlide6.xml><?xml version="1.0" encoding="utf-8"?>
+<p:notes xmlns:a="http://schemas.openxmlformats.org/drawingml/2006/main" xmlns:r="http://schemas.openxmlformats.org/officeDocument/2006/relationships" xmlns:p="http://schemas.openxmlformats.org/presentationml/2006/main">
+  <p:cSld>
+    <p:spTree>
+      <p:nvGrpSpPr>
+        <p:cNvPr id="1" name=""/>
+        <p:cNvGrpSpPr/>
+        <p:nvPr/>
+      </p:nvGrpSpPr>
+      <p:grpSpPr>
+        <a:xfrm>
+          <a:off x="0" y="0"/>
+          <a:ext cx="0" cy="0"/>
+          <a:chOff x="0" y="0"/>
+          <a:chExt cx="0" cy="0"/>
+        </a:xfrm>
+      </p:grpSpPr>
+      <p:sp>
+        <p:nvSpPr>
+          <p:cNvPr id="2" name="Образ слайда 1"/>
+          <p:cNvSpPr>
+            <a:spLocks noGrp="1" noRot="1" noChangeAspect="1"/>
+          </p:cNvSpPr>
+          <p:nvPr>
+            <p:ph type="sldImg"/>
+          </p:nvPr>
+        </p:nvSpPr>
+        <p:spPr/>
+      </p:sp>
+      <p:sp>
+        <p:nvSpPr>
+          <p:cNvPr id="3" name="Заметки 2"/>
+          <p:cNvSpPr>
+            <a:spLocks noGrp="1"/>
+          </p:cNvSpPr>
+          <p:nvPr>
+            <p:ph type="body" idx="1"/>
+          </p:nvPr>
+        </p:nvSpPr>
+        <p:spPr/>
+        <p:txBody>
+          <a:bodyPr/>
+          <a:lstStyle/>
+          <a:p>
+            <a:r>
+              <a:rPr lang="ru-RU" dirty="0"/>
+              <a:t>Упрощение доступа к информации о зале</a:t>
+            </a:r>
+          </a:p>
+          <a:p>
+            <a:r>
+              <a:rPr lang="ru-RU" dirty="0"/>
+              <a:t>Обеспечение синхронизации данных о бронях</a:t>
+            </a:r>
+          </a:p>
+          <a:p>
+            <a:r>
+              <a:rPr lang="ru-RU" dirty="0"/>
+              <a:t>И о занятости столов</a:t>
+            </a:r>
+          </a:p>
+          <a:p>
+            <a:endParaRPr lang="ru-RU" dirty="0"/>
+          </a:p>
+          <a:p>
+            <a:r>
+              <a:rPr lang="ru-RU" dirty="0"/>
+              <a:t>Для администраторов – управление столами и сотрудниками</a:t>
+            </a:r>
+          </a:p>
+        </p:txBody>
+      </p:sp>
+      <p:sp>
+        <p:nvSpPr>
+          <p:cNvPr id="4" name="Номер слайда 3"/>
+          <p:cNvSpPr>
+            <a:spLocks noGrp="1"/>
+          </p:cNvSpPr>
+          <p:nvPr>
+            <p:ph type="sldNum" sz="quarter" idx="5"/>
+          </p:nvPr>
+        </p:nvSpPr>
+        <p:spPr/>
+        <p:txBody>
+          <a:bodyPr/>
+          <a:lstStyle/>
+          <a:p>
+            <a:fld id="{6D5D9A67-3DE5-459E-8D3F-A02553138B9D}" type="slidenum">
+              <a:rPr lang="ru-RU" smtClean="0"/>
+              <a:t>6</a:t>
+            </a:fld>
+            <a:endParaRPr lang="ru-RU"/>
+          </a:p>
+        </p:txBody>
+      </p:sp>
+    </p:spTree>
+    <p:extLst>
+      <p:ext uri="{BB962C8B-B14F-4D97-AF65-F5344CB8AC3E}">
+        <p14:creationId xmlns:p14="http://schemas.microsoft.com/office/powerpoint/2010/main" val="2187482381"/>
+      </p:ext>
+    </p:extLst>
+  </p:cSld>
+  <p:clrMapOvr>
+    <a:masterClrMapping/>
+  </p:clrMapOvr>
+</p:notes>
+</file>
+
+<file path=ppt/notesSlides/notesSlide7.xml><?xml version="1.0" encoding="utf-8"?>
+<p:notes xmlns:a="http://schemas.openxmlformats.org/drawingml/2006/main" xmlns:r="http://schemas.openxmlformats.org/officeDocument/2006/relationships" xmlns:p="http://schemas.openxmlformats.org/presentationml/2006/main">
+  <p:cSld>
+    <p:spTree>
+      <p:nvGrpSpPr>
+        <p:cNvPr id="1" name=""/>
+        <p:cNvGrpSpPr/>
+        <p:nvPr/>
+      </p:nvGrpSpPr>
+      <p:grpSpPr>
+        <a:xfrm>
+          <a:off x="0" y="0"/>
+          <a:ext cx="0" cy="0"/>
+          <a:chOff x="0" y="0"/>
+          <a:chExt cx="0" cy="0"/>
+        </a:xfrm>
+      </p:grpSpPr>
+      <p:sp>
+        <p:nvSpPr>
+          <p:cNvPr id="2" name="Образ слайда 1"/>
+          <p:cNvSpPr>
+            <a:spLocks noGrp="1" noRot="1" noChangeAspect="1"/>
+          </p:cNvSpPr>
+          <p:nvPr>
+            <p:ph type="sldImg"/>
+          </p:nvPr>
+        </p:nvSpPr>
+        <p:spPr/>
+      </p:sp>
+      <p:sp>
+        <p:nvSpPr>
+          <p:cNvPr id="3" name="Заметки 2"/>
+          <p:cNvSpPr>
+            <a:spLocks noGrp="1"/>
+          </p:cNvSpPr>
+          <p:nvPr>
+            <p:ph type="body" idx="1"/>
+          </p:nvPr>
+        </p:nvSpPr>
+        <p:spPr/>
+        <p:txBody>
+          <a:bodyPr/>
+          <a:lstStyle/>
+          <a:p>
+            <a:r>
+              <a:rPr lang="ru-RU" dirty="0"/>
+              <a:t>Приступить к созданию брони в один клик!</a:t>
+            </a:r>
+          </a:p>
+        </p:txBody>
+      </p:sp>
+      <p:sp>
+        <p:nvSpPr>
+          <p:cNvPr id="4" name="Номер слайда 3"/>
+          <p:cNvSpPr>
+            <a:spLocks noGrp="1"/>
+          </p:cNvSpPr>
+          <p:nvPr>
+            <p:ph type="sldNum" sz="quarter" idx="5"/>
+          </p:nvPr>
+        </p:nvSpPr>
+        <p:spPr/>
+        <p:txBody>
+          <a:bodyPr/>
+          <a:lstStyle/>
+          <a:p>
+            <a:fld id="{6D5D9A67-3DE5-459E-8D3F-A02553138B9D}" type="slidenum">
+              <a:rPr lang="ru-RU" smtClean="0"/>
+              <a:t>7</a:t>
+            </a:fld>
+            <a:endParaRPr lang="ru-RU"/>
+          </a:p>
+        </p:txBody>
+      </p:sp>
+    </p:spTree>
+    <p:extLst>
+      <p:ext uri="{BB962C8B-B14F-4D97-AF65-F5344CB8AC3E}">
+        <p14:creationId xmlns:p14="http://schemas.microsoft.com/office/powerpoint/2010/main" val="3274275506"/>
+      </p:ext>
+    </p:extLst>
+  </p:cSld>
+  <p:clrMapOvr>
+    <a:masterClrMapping/>
+  </p:clrMapOvr>
+</p:notes>
+</file>
+
+<file path=ppt/notesSlides/notesSlide8.xml><?xml version="1.0" encoding="utf-8"?>
+<p:notes xmlns:a="http://schemas.openxmlformats.org/drawingml/2006/main" xmlns:r="http://schemas.openxmlformats.org/officeDocument/2006/relationships" xmlns:p="http://schemas.openxmlformats.org/presentationml/2006/main">
+  <p:cSld>
+    <p:spTree>
+      <p:nvGrpSpPr>
+        <p:cNvPr id="1" name=""/>
+        <p:cNvGrpSpPr/>
+        <p:nvPr/>
+      </p:nvGrpSpPr>
+      <p:grpSpPr>
+        <a:xfrm>
+          <a:off x="0" y="0"/>
+          <a:ext cx="0" cy="0"/>
+          <a:chOff x="0" y="0"/>
+          <a:chExt cx="0" cy="0"/>
+        </a:xfrm>
+      </p:grpSpPr>
+      <p:sp>
+        <p:nvSpPr>
+          <p:cNvPr id="2" name="Образ слайда 1"/>
+          <p:cNvSpPr>
+            <a:spLocks noGrp="1" noRot="1" noChangeAspect="1"/>
+          </p:cNvSpPr>
+          <p:nvPr>
+            <p:ph type="sldImg"/>
+          </p:nvPr>
+        </p:nvSpPr>
+        <p:spPr/>
+      </p:sp>
+      <p:sp>
+        <p:nvSpPr>
+          <p:cNvPr id="3" name="Заметки 2"/>
+          <p:cNvSpPr>
+            <a:spLocks noGrp="1"/>
+          </p:cNvSpPr>
+          <p:nvPr>
+            <p:ph type="body" idx="1"/>
+          </p:nvPr>
+        </p:nvSpPr>
+        <p:spPr/>
+        <p:txBody>
+          <a:bodyPr/>
+          <a:lstStyle/>
+          <a:p>
+            <a:r>
+              <a:rPr lang="ru-RU" dirty="0"/>
+              <a:t>Есть направления улучшения</a:t>
+            </a:r>
+          </a:p>
+          <a:p>
+            <a:r>
+              <a:rPr lang="ru-RU" dirty="0"/>
+              <a:t>Упростить способ ввода данных о брони</a:t>
+            </a:r>
+          </a:p>
+        </p:txBody>
+      </p:sp>
+      <p:sp>
+        <p:nvSpPr>
+          <p:cNvPr id="4" name="Номер слайда 3"/>
+          <p:cNvSpPr>
+            <a:spLocks noGrp="1"/>
+          </p:cNvSpPr>
+          <p:nvPr>
+            <p:ph type="sldNum" sz="quarter" idx="5"/>
+          </p:nvPr>
+        </p:nvSpPr>
+        <p:spPr/>
+        <p:txBody>
+          <a:bodyPr/>
+          <a:lstStyle/>
+          <a:p>
+            <a:fld id="{6D5D9A67-3DE5-459E-8D3F-A02553138B9D}" type="slidenum">
+              <a:rPr lang="ru-RU" smtClean="0"/>
+              <a:t>8</a:t>
+            </a:fld>
+            <a:endParaRPr lang="ru-RU"/>
+          </a:p>
+        </p:txBody>
+      </p:sp>
+    </p:spTree>
+    <p:extLst>
+      <p:ext uri="{BB962C8B-B14F-4D97-AF65-F5344CB8AC3E}">
+        <p14:creationId xmlns:p14="http://schemas.microsoft.com/office/powerpoint/2010/main" val="3289182576"/>
+      </p:ext>
+    </p:extLst>
+  </p:cSld>
+  <p:clrMapOvr>
+    <a:masterClrMapping/>
+  </p:clrMapOvr>
+</p:notes>
+</file>
+
+<file path=ppt/notesSlides/notesSlide9.xml><?xml version="1.0" encoding="utf-8"?>
+<p:notes xmlns:a="http://schemas.openxmlformats.org/drawingml/2006/main" xmlns:r="http://schemas.openxmlformats.org/officeDocument/2006/relationships" xmlns:p="http://schemas.openxmlformats.org/presentationml/2006/main">
+  <p:cSld>
+    <p:spTree>
+      <p:nvGrpSpPr>
+        <p:cNvPr id="1" name=""/>
+        <p:cNvGrpSpPr/>
+        <p:nvPr/>
+      </p:nvGrpSpPr>
+      <p:grpSpPr>
+        <a:xfrm>
+          <a:off x="0" y="0"/>
+          <a:ext cx="0" cy="0"/>
+          <a:chOff x="0" y="0"/>
+          <a:chExt cx="0" cy="0"/>
+        </a:xfrm>
+      </p:grpSpPr>
+      <p:sp>
+        <p:nvSpPr>
+          <p:cNvPr id="2" name="Образ слайда 1"/>
+          <p:cNvSpPr>
+            <a:spLocks noGrp="1" noRot="1" noChangeAspect="1"/>
+          </p:cNvSpPr>
+          <p:nvPr>
+            <p:ph type="sldImg"/>
+          </p:nvPr>
+        </p:nvSpPr>
+        <p:spPr/>
+      </p:sp>
+      <p:sp>
+        <p:nvSpPr>
+          <p:cNvPr id="3" name="Заметки 2"/>
+          <p:cNvSpPr>
+            <a:spLocks noGrp="1"/>
+          </p:cNvSpPr>
+          <p:nvPr>
+            <p:ph type="body" idx="1"/>
+          </p:nvPr>
+        </p:nvSpPr>
+        <p:spPr/>
+        <p:txBody>
+          <a:bodyPr/>
+          <a:lstStyle/>
+          <a:p>
+            <a:r>
+              <a:rPr lang="ru-RU" dirty="0"/>
+              <a:t>Ежемесячная подписка</a:t>
+            </a:r>
+          </a:p>
+          <a:p>
+            <a:r>
+              <a:rPr lang="ru-RU" dirty="0"/>
+              <a:t>В будущем дополнительные тарифы</a:t>
+            </a:r>
+          </a:p>
+        </p:txBody>
+      </p:sp>
+      <p:sp>
+        <p:nvSpPr>
+          <p:cNvPr id="4" name="Номер слайда 3"/>
+          <p:cNvSpPr>
+            <a:spLocks noGrp="1"/>
+          </p:cNvSpPr>
+          <p:nvPr>
+            <p:ph type="sldNum" sz="quarter" idx="5"/>
+          </p:nvPr>
+        </p:nvSpPr>
+        <p:spPr/>
+        <p:txBody>
+          <a:bodyPr/>
+          <a:lstStyle/>
+          <a:p>
+            <a:fld id="{6D5D9A67-3DE5-459E-8D3F-A02553138B9D}" type="slidenum">
+              <a:rPr lang="ru-RU" smtClean="0"/>
+              <a:t>9</a:t>
+            </a:fld>
+            <a:endParaRPr lang="ru-RU"/>
+          </a:p>
+        </p:txBody>
+      </p:sp>
+    </p:spTree>
+    <p:extLst>
+      <p:ext uri="{BB962C8B-B14F-4D97-AF65-F5344CB8AC3E}">
+        <p14:creationId xmlns:p14="http://schemas.microsoft.com/office/powerpoint/2010/main" val="2548859568"/>
+      </p:ext>
+    </p:extLst>
+  </p:cSld>
+  <p:clrMapOvr>
+    <a:masterClrMapping/>
+  </p:clrMapOvr>
+</p:notes>
+</file>
+
 <file path=ppt/slideLayouts/slideLayout1.xml><?xml version="1.0" encoding="utf-8"?>
 <p:sldLayout xmlns:a="http://schemas.openxmlformats.org/drawingml/2006/main" xmlns:r="http://schemas.openxmlformats.org/officeDocument/2006/relationships" xmlns:p="http://schemas.openxmlformats.org/presentationml/2006/main" showMasterSp="0" type="title" preserve="1">
   <p:cSld name="Титульный слайд">
@@ -11248,7 +12606,7 @@
           <p:nvPr/>
         </p:nvPicPr>
         <p:blipFill rotWithShape="1">
-          <a:blip r:embed="rId2">
+          <a:blip r:embed="rId3">
             <a:extLst>
               <a:ext uri="{28A0092B-C50C-407E-A947-70E740481C1C}">
                 <a14:useLocalDpi xmlns:a14="http://schemas.microsoft.com/office/drawing/2010/main" val="0"/>
@@ -11337,39 +12695,39 @@
           <a:p>
             <a:pPr algn="r"/>
             <a:r>
-              <a:rPr lang="ru-RU" dirty="0"/>
+              <a:rPr lang="ru-RU" b="0" cap="none" dirty="0"/>
               <a:t>Путин Павел</a:t>
             </a:r>
           </a:p>
           <a:p>
             <a:pPr algn="r"/>
             <a:r>
-              <a:rPr lang="ru-RU" dirty="0"/>
+              <a:rPr lang="ru-RU" b="0" cap="none" dirty="0"/>
               <a:t>Ефремов Михаил</a:t>
             </a:r>
           </a:p>
           <a:p>
             <a:pPr algn="r"/>
             <a:r>
-              <a:rPr lang="ru-RU" dirty="0" err="1"/>
+              <a:rPr lang="ru-RU" b="0" cap="none" dirty="0" err="1"/>
               <a:t>Насайр</a:t>
             </a:r>
             <a:r>
-              <a:rPr lang="ru-RU" dirty="0"/>
+              <a:rPr lang="ru-RU" b="0" cap="none" dirty="0"/>
               <a:t> Марьям</a:t>
             </a:r>
           </a:p>
           <a:p>
             <a:pPr algn="r"/>
             <a:r>
-              <a:rPr lang="ru-RU" dirty="0"/>
+              <a:rPr lang="ru-RU" b="0" cap="none" dirty="0"/>
               <a:t>Ноэль </a:t>
             </a:r>
             <a:r>
-              <a:rPr lang="ru-RU" dirty="0" err="1"/>
+              <a:rPr lang="ru-RU" b="0" cap="none" dirty="0" err="1"/>
               <a:t>Жулмист</a:t>
             </a:r>
-            <a:endParaRPr lang="ru-RU" dirty="0"/>
+            <a:endParaRPr lang="ru-RU" b="0" cap="none" dirty="0"/>
           </a:p>
         </p:txBody>
       </p:sp>
@@ -11427,7 +12785,7 @@
         <p:spPr>
           <a:xfrm>
             <a:off x="5422578" y="4998642"/>
-            <a:ext cx="1476686" cy="400110"/>
+            <a:ext cx="1688283" cy="400110"/>
           </a:xfrm>
           <a:prstGeom prst="rect">
             <a:avLst/>
@@ -11445,7 +12803,6 @@
                 <a:solidFill>
                   <a:schemeClr val="tx2"/>
                 </a:solidFill>
-                <a:latin typeface="+mj-lt"/>
               </a:rPr>
               <a:t>Команда 7.1</a:t>
             </a:r>
@@ -11453,7 +12810,6 @@
               <a:solidFill>
                 <a:schemeClr val="tx2"/>
               </a:solidFill>
-              <a:latin typeface="+mj-lt"/>
             </a:endParaRPr>
           </a:p>
         </p:txBody>
@@ -11532,7 +12888,7 @@
             <p:ph idx="1"/>
             <p:extLst>
               <p:ext uri="{D42A27DB-BD31-4B8C-83A1-F6EECF244321}">
-                <p14:modId xmlns:p14="http://schemas.microsoft.com/office/powerpoint/2010/main" val="1473786911"/>
+                <p14:modId xmlns:p14="http://schemas.microsoft.com/office/powerpoint/2010/main" val="3463011179"/>
               </p:ext>
             </p:extLst>
           </p:nvPr>
@@ -11781,9 +13137,19 @@
                             <a:schemeClr val="tx1"/>
                           </a:solidFill>
                           <a:effectLst/>
+                          <a:latin typeface="+mn-lt"/>
+                        </a:rPr>
+                        <a:t>750</a:t>
+                      </a:r>
+                      <a:r>
+                        <a:rPr lang="en-US" sz="4800" dirty="0">
+                          <a:solidFill>
+                            <a:schemeClr val="tx1"/>
+                          </a:solidFill>
+                          <a:effectLst/>
                           <a:latin typeface="Pacifico" panose="020F0502020204030204" pitchFamily="2" charset="-52"/>
                         </a:rPr>
-                        <a:t>750 </a:t>
+                        <a:t> </a:t>
                       </a:r>
                       <a:r>
                         <a:rPr lang="ru-RU" sz="4800" kern="1200" dirty="0">
@@ -12858,7 +14224,7 @@
         </p:xfrm>
         <a:graphic>
           <a:graphicData uri="http://schemas.openxmlformats.org/drawingml/2006/chart">
-            <c:chart xmlns:c="http://schemas.openxmlformats.org/drawingml/2006/chart" xmlns:r="http://schemas.openxmlformats.org/officeDocument/2006/relationships" r:id="rId2"/>
+            <c:chart xmlns:c="http://schemas.openxmlformats.org/drawingml/2006/chart" xmlns:r="http://schemas.openxmlformats.org/officeDocument/2006/relationships" r:id="rId3"/>
           </a:graphicData>
         </a:graphic>
       </p:graphicFrame>
@@ -12976,7 +14342,7 @@
         </p:xfrm>
         <a:graphic>
           <a:graphicData uri="http://schemas.openxmlformats.org/drawingml/2006/chart">
-            <c:chart xmlns:c="http://schemas.openxmlformats.org/drawingml/2006/chart" xmlns:r="http://schemas.openxmlformats.org/officeDocument/2006/relationships" r:id="rId2"/>
+            <c:chart xmlns:c="http://schemas.openxmlformats.org/drawingml/2006/chart" xmlns:r="http://schemas.openxmlformats.org/officeDocument/2006/relationships" r:id="rId3"/>
           </a:graphicData>
         </a:graphic>
       </p:graphicFrame>
@@ -13519,7 +14885,11 @@
           <a:lstStyle/>
           <a:p>
             <a:r>
-              <a:rPr lang="ru-RU" sz="3200" dirty="0"/>
+              <a:rPr lang="ru-RU" sz="3200" b="0" dirty="0">
+                <a:solidFill>
+                  <a:schemeClr val="tx1"/>
+                </a:solidFill>
+              </a:rPr>
               <a:t>Создание брони всегда под рукой</a:t>
             </a:r>
           </a:p>
@@ -13571,7 +14941,7 @@
           </p:nvPr>
         </p:nvPicPr>
         <p:blipFill rotWithShape="1">
-          <a:blip r:embed="rId2">
+          <a:blip r:embed="rId3">
             <a:extLst>
               <a:ext uri="{28A0092B-C50C-407E-A947-70E740481C1C}">
                 <a14:useLocalDpi xmlns:a14="http://schemas.microsoft.com/office/drawing/2010/main" val="0"/>
@@ -13723,7 +15093,7 @@
           <p:nvPr>
             <p:extLst>
               <p:ext uri="{D42A27DB-BD31-4B8C-83A1-F6EECF244321}">
-                <p14:modId xmlns:p14="http://schemas.microsoft.com/office/powerpoint/2010/main" val="3174801971"/>
+                <p14:modId xmlns:p14="http://schemas.microsoft.com/office/powerpoint/2010/main" val="2031482524"/>
               </p:ext>
             </p:extLst>
           </p:nvPr>
@@ -13734,7 +15104,7 @@
         </p:xfrm>
         <a:graphic>
           <a:graphicData uri="http://schemas.openxmlformats.org/drawingml/2006/chart">
-            <c:chart xmlns:c="http://schemas.openxmlformats.org/drawingml/2006/chart" xmlns:r="http://schemas.openxmlformats.org/officeDocument/2006/relationships" r:id="rId2"/>
+            <c:chart xmlns:c="http://schemas.openxmlformats.org/drawingml/2006/chart" xmlns:r="http://schemas.openxmlformats.org/officeDocument/2006/relationships" r:id="rId3"/>
           </a:graphicData>
         </a:graphic>
       </p:graphicFrame>

</xml_diff>

<commit_message>
fix: remove small typos
</commit_message>
<xml_diff>
--- a/presentation (product)/Restobook.pptx
+++ b/presentation (product)/Restobook.pptx
@@ -390,7 +390,7 @@
                   <a:bodyPr/>
                   <a:lstStyle/>
                   <a:p>
-                    <a:fld id="{70F51BB1-63D0-4EC9-ABA1-F759F056D57D}" type="CELLRANGE">
+                    <a:fld id="{7C0D05B5-6C29-4ED3-BCD5-ACEDADF3679A}" type="CELLRANGE">
                       <a:rPr lang="ru-RU"/>
                       <a:pPr/>
                       <a:t>[ДИАПАЗОН ЯЧЕЕК]</a:t>
@@ -424,7 +424,7 @@
                   <a:bodyPr/>
                   <a:lstStyle/>
                   <a:p>
-                    <a:fld id="{E71EDC5D-F55A-4ECC-8DC8-41C7F96CF257}" type="CELLRANGE">
+                    <a:fld id="{CF2A1DA7-0B3C-41E7-9179-6672C11EF14B}" type="CELLRANGE">
                       <a:rPr lang="ru-RU"/>
                       <a:pPr/>
                       <a:t>[ДИАПАЗОН ЯЧЕЕК]</a:t>
@@ -458,7 +458,7 @@
                   <a:bodyPr/>
                   <a:lstStyle/>
                   <a:p>
-                    <a:fld id="{6198A920-F8B2-4A82-AB59-E18BFDDCC846}" type="CELLRANGE">
+                    <a:fld id="{BFBD075D-F8B2-4EC4-8EF8-6F177D5D2057}" type="CELLRANGE">
                       <a:rPr lang="ru-RU"/>
                       <a:pPr/>
                       <a:t>[ДИАПАЗОН ЯЧЕЕК]</a:t>
@@ -1157,8 +1157,8 @@
                   <a:bodyPr/>
                   <a:lstStyle/>
                   <a:p>
-                    <a:fld id="{36FE1A57-F61E-4FB3-B956-0C789E6448B5}" type="CELLRANGE">
-                      <a:rPr lang="ru-RU"/>
+                    <a:fld id="{95DD3570-2B51-4EFB-A159-B4BBA7BF44B2}" type="CELLRANGE">
+                      <a:rPr lang="en-US"/>
                       <a:pPr/>
                       <a:t>[ДИАПАЗОН ЯЧЕЕК]</a:t>
                     </a:fld>
@@ -1166,7 +1166,7 @@
                   </a:p>
                 </c:rich>
               </c:tx>
-              <c:dLblPos val="outEnd"/>
+              <c:dLblPos val="inEnd"/>
               <c:showLegendKey val="0"/>
               <c:showVal val="0"/>
               <c:showCatName val="0"/>
@@ -1176,7 +1176,6 @@
               <c:extLst>
                 <c:ext xmlns:c15="http://schemas.microsoft.com/office/drawing/2012/chart" uri="{CE6537A1-D6FC-4f65-9D91-7224C49458BB}">
                   <c15:dlblFieldTable/>
-                  <c15:xForSave val="1"/>
                   <c15:showDataLabelsRange val="1"/>
                 </c:ext>
                 <c:ext xmlns:c16="http://schemas.microsoft.com/office/drawing/2014/chart" uri="{C3380CC4-5D6E-409C-BE32-E72D297353CC}">
@@ -1191,7 +1190,7 @@
                   <a:bodyPr/>
                   <a:lstStyle/>
                   <a:p>
-                    <a:fld id="{F189EE74-DB45-4E68-AD04-6FBE48D7EA43}" type="CELLRANGE">
+                    <a:fld id="{8D0AE45C-282E-43E9-9127-6C3036854EB7}" type="CELLRANGE">
                       <a:rPr lang="ru-RU"/>
                       <a:pPr/>
                       <a:t>[ДИАПАЗОН ЯЧЕЕК]</a:t>
@@ -1225,7 +1224,7 @@
                   <a:bodyPr/>
                   <a:lstStyle/>
                   <a:p>
-                    <a:fld id="{F3A5DF22-DF41-47D2-B43C-8BEFE9A1FF13}" type="CELLRANGE">
+                    <a:fld id="{D78F6B6E-0BC5-44C4-BC1E-8525CDE9F28F}" type="CELLRANGE">
                       <a:rPr lang="ru-RU"/>
                       <a:pPr/>
                       <a:t>[ДИАПАЗОН ЯЧЕЕК]</a:t>
@@ -1911,7 +1910,7 @@
                   <a:bodyPr/>
                   <a:lstStyle/>
                   <a:p>
-                    <a:fld id="{F276E3DB-FA3B-4596-AFFD-EFED53C3C649}" type="CELLRANGE">
+                    <a:fld id="{5F8ECAD0-B256-419A-8411-0CC8D4E8DA5F}" type="CELLRANGE">
                       <a:rPr lang="ru-RU"/>
                       <a:pPr/>
                       <a:t>[ДИАПАЗОН ЯЧЕЕК]</a:t>
@@ -4039,7 +4038,7 @@
           <a:p>
             <a:fld id="{90ABE644-5DA6-4F42-9056-5E70F70D6CF2}" type="datetimeFigureOut">
               <a:rPr lang="ru-RU" smtClean="0"/>
-              <a:t>28.05.2024</a:t>
+              <a:t>29.05.2024</a:t>
             </a:fld>
             <a:endParaRPr lang="ru-RU"/>
           </a:p>
@@ -6829,7 +6828,7 @@
           <a:p>
             <a:fld id="{B2D52420-6A92-4DC2-8591-889C8603F9D7}" type="datetime1">
               <a:rPr lang="ru-RU" smtClean="0"/>
-              <a:t>28.05.2024</a:t>
+              <a:t>29.05.2024</a:t>
             </a:fld>
             <a:endParaRPr lang="ru-RU"/>
           </a:p>
@@ -7094,7 +7093,7 @@
           <a:p>
             <a:fld id="{AFC6059B-B3EB-47F3-8BC6-5CF7158CCF5E}" type="datetime1">
               <a:rPr lang="ru-RU" smtClean="0"/>
-              <a:t>28.05.2024</a:t>
+              <a:t>29.05.2024</a:t>
             </a:fld>
             <a:endParaRPr lang="ru-RU"/>
           </a:p>
@@ -7296,7 +7295,7 @@
           <a:p>
             <a:fld id="{672DA8F7-9E1C-4330-89D8-5ACAE3F4BA4B}" type="datetime1">
               <a:rPr lang="ru-RU" smtClean="0"/>
-              <a:t>28.05.2024</a:t>
+              <a:t>29.05.2024</a:t>
             </a:fld>
             <a:endParaRPr lang="ru-RU"/>
           </a:p>
@@ -7498,7 +7497,7 @@
           <a:p>
             <a:fld id="{F4997B83-498B-4930-8185-A988F003D33A}" type="datetime1">
               <a:rPr lang="ru-RU" smtClean="0"/>
-              <a:t>28.05.2024</a:t>
+              <a:t>29.05.2024</a:t>
             </a:fld>
             <a:endParaRPr lang="ru-RU"/>
           </a:p>
@@ -7791,7 +7790,7 @@
           <a:p>
             <a:fld id="{3ABD95BC-C76F-444E-B3FB-BD27E4F798B7}" type="datetime1">
               <a:rPr lang="ru-RU" smtClean="0"/>
-              <a:t>28.05.2024</a:t>
+              <a:t>29.05.2024</a:t>
             </a:fld>
             <a:endParaRPr lang="ru-RU"/>
           </a:p>
@@ -9024,7 +9023,7 @@
           <a:p>
             <a:fld id="{E13DA6AE-AB60-4652-AB2E-D952392D1655}" type="datetime1">
               <a:rPr lang="ru-RU" smtClean="0"/>
-              <a:t>28.05.2024</a:t>
+              <a:t>29.05.2024</a:t>
             </a:fld>
             <a:endParaRPr lang="ru-RU"/>
           </a:p>
@@ -9445,7 +9444,7 @@
           <a:p>
             <a:fld id="{5E0F9A4F-E2CF-4D07-BEAB-A6631996DDD1}" type="datetime1">
               <a:rPr lang="ru-RU" smtClean="0"/>
-              <a:t>28.05.2024</a:t>
+              <a:t>29.05.2024</a:t>
             </a:fld>
             <a:endParaRPr lang="ru-RU"/>
           </a:p>
@@ -9592,7 +9591,7 @@
           <a:p>
             <a:fld id="{06D2A858-6E04-484B-9C45-539F27E3937C}" type="datetime1">
               <a:rPr lang="ru-RU" smtClean="0"/>
-              <a:t>28.05.2024</a:t>
+              <a:t>29.05.2024</a:t>
             </a:fld>
             <a:endParaRPr lang="ru-RU"/>
           </a:p>
@@ -9703,7 +9702,7 @@
           <a:p>
             <a:fld id="{AC6B3F91-F2E8-4402-9B00-8213E0D61D50}" type="datetime1">
               <a:rPr lang="ru-RU" smtClean="0"/>
-              <a:t>28.05.2024</a:t>
+              <a:t>29.05.2024</a:t>
             </a:fld>
             <a:endParaRPr lang="ru-RU"/>
           </a:p>
@@ -10486,7 +10485,7 @@
           <a:p>
             <a:fld id="{50FCF844-36E3-4D2D-9EE0-8615F370CF07}" type="datetime1">
               <a:rPr lang="ru-RU" smtClean="0"/>
-              <a:t>28.05.2024</a:t>
+              <a:t>29.05.2024</a:t>
             </a:fld>
             <a:endParaRPr lang="ru-RU"/>
           </a:p>
@@ -11343,7 +11342,7 @@
           <a:p>
             <a:fld id="{8C256B46-112F-45DA-B602-9179791C6F92}" type="datetime1">
               <a:rPr lang="ru-RU" smtClean="0"/>
-              <a:t>28.05.2024</a:t>
+              <a:t>29.05.2024</a:t>
             </a:fld>
             <a:endParaRPr lang="ru-RU"/>
           </a:p>
@@ -12134,7 +12133,7 @@
           <a:p>
             <a:fld id="{629052EF-D6AA-42E2-9131-813E79594612}" type="datetimeFigureOut">
               <a:rPr lang="ru-RU" smtClean="0"/>
-              <a:t>28.05.2024</a:t>
+              <a:t>29.05.2024</a:t>
             </a:fld>
             <a:endParaRPr lang="ru-RU"/>
           </a:p>
@@ -14331,7 +14330,7 @@
             <p:ph idx="1"/>
             <p:extLst>
               <p:ext uri="{D42A27DB-BD31-4B8C-83A1-F6EECF244321}">
-                <p14:modId xmlns:p14="http://schemas.microsoft.com/office/powerpoint/2010/main" val="4120693602"/>
+                <p14:modId xmlns:p14="http://schemas.microsoft.com/office/powerpoint/2010/main" val="1287067408"/>
               </p:ext>
             </p:extLst>
           </p:nvPr>

</xml_diff>

<commit_message>
fix: fix diagrams colors
</commit_message>
<xml_diff>
--- a/presentation (product)/Restobook.pptx
+++ b/presentation (product)/Restobook.pptx
@@ -159,12 +159,9 @@
           <a:lstStyle/>
           <a:p>
             <a:pPr>
-              <a:defRPr sz="1862" b="0" i="0" u="none" strike="noStrike" kern="1200" spc="0" baseline="0">
+              <a:defRPr sz="3200" b="0" i="0" u="none" strike="noStrike" kern="1200" spc="0" baseline="0">
                 <a:solidFill>
-                  <a:schemeClr val="tx1">
-                    <a:lumMod val="65000"/>
-                    <a:lumOff val="35000"/>
-                  </a:schemeClr>
+                  <a:schemeClr val="tx1"/>
                 </a:solidFill>
                 <a:latin typeface="+mn-lt"/>
                 <a:ea typeface="+mn-ea"/>
@@ -172,7 +169,11 @@
               </a:defRPr>
             </a:pPr>
             <a:r>
-              <a:rPr lang="ru-RU" dirty="0"/>
+              <a:rPr lang="ru-RU" sz="3200" dirty="0">
+                <a:solidFill>
+                  <a:schemeClr val="tx1"/>
+                </a:solidFill>
+              </a:rPr>
               <a:t>Оборот рынка</a:t>
             </a:r>
           </a:p>
@@ -191,12 +192,9 @@
         <a:lstStyle/>
         <a:p>
           <a:pPr>
-            <a:defRPr sz="1862" b="0" i="0" u="none" strike="noStrike" kern="1200" spc="0" baseline="0">
+            <a:defRPr sz="3200" b="0" i="0" u="none" strike="noStrike" kern="1200" spc="0" baseline="0">
               <a:solidFill>
-                <a:schemeClr val="tx1">
-                  <a:lumMod val="65000"/>
-                  <a:lumOff val="35000"/>
-                </a:schemeClr>
+                <a:schemeClr val="tx1"/>
               </a:solidFill>
               <a:latin typeface="+mn-lt"/>
               <a:ea typeface="+mn-ea"/>
@@ -209,7 +207,17 @@
     </c:title>
     <c:autoTitleDeleted val="0"/>
     <c:plotArea>
-      <c:layout/>
+      <c:layout>
+        <c:manualLayout>
+          <c:layoutTarget val="inner"/>
+          <c:xMode val="edge"/>
+          <c:yMode val="edge"/>
+          <c:x val="4.7417391603342157E-2"/>
+          <c:y val="0.23590673317716795"/>
+          <c:w val="0.93885834139728164"/>
+          <c:h val="0.62720383025392323"/>
+        </c:manualLayout>
+      </c:layout>
       <c:barChart>
         <c:barDir val="col"/>
         <c:grouping val="clustered"/>
@@ -219,7 +227,7 @@
           <c:order val="0"/>
           <c:spPr>
             <a:solidFill>
-              <a:schemeClr val="accent1"/>
+              <a:schemeClr val="tx1"/>
             </a:solidFill>
             <a:ln>
               <a:noFill/>
@@ -242,12 +250,9 @@
               <a:lstStyle/>
               <a:p>
                 <a:pPr>
-                  <a:defRPr sz="1197" b="0" i="0" u="none" strike="noStrike" kern="1200" baseline="0">
+                  <a:defRPr sz="2400" b="0" i="0" u="none" strike="noStrike" kern="1200" baseline="0">
                     <a:solidFill>
-                      <a:schemeClr val="tx1">
-                        <a:lumMod val="75000"/>
-                        <a:lumOff val="25000"/>
-                      </a:schemeClr>
+                      <a:schemeClr val="tx1"/>
                     </a:solidFill>
                     <a:latin typeface="+mn-lt"/>
                     <a:ea typeface="+mn-ea"/>
@@ -357,7 +362,7 @@
                   <a:bodyPr/>
                   <a:lstStyle/>
                   <a:p>
-                    <a:fld id="{BFCBF3C2-4038-4447-9FB2-1D68D9810C05}" type="CELLRANGE">
+                    <a:fld id="{2842E369-3A59-4C36-8CED-220F7E6362F5}" type="CELLRANGE">
                       <a:rPr lang="en-US"/>
                       <a:pPr/>
                       <a:t>[ДИАПАЗОН ЯЧЕЕК]</a:t>
@@ -390,7 +395,7 @@
                   <a:bodyPr/>
                   <a:lstStyle/>
                   <a:p>
-                    <a:fld id="{7C0D05B5-6C29-4ED3-BCD5-ACEDADF3679A}" type="CELLRANGE">
+                    <a:fld id="{211764EB-0317-456A-90F3-ED5210C56887}" type="CELLRANGE">
                       <a:rPr lang="ru-RU"/>
                       <a:pPr/>
                       <a:t>[ДИАПАЗОН ЯЧЕЕК]</a:t>
@@ -424,7 +429,7 @@
                   <a:bodyPr/>
                   <a:lstStyle/>
                   <a:p>
-                    <a:fld id="{CF2A1DA7-0B3C-41E7-9179-6672C11EF14B}" type="CELLRANGE">
+                    <a:fld id="{13F902FD-7A65-48D2-B537-8BE356FDBF3B}" type="CELLRANGE">
                       <a:rPr lang="ru-RU"/>
                       <a:pPr/>
                       <a:t>[ДИАПАЗОН ЯЧЕЕК]</a:t>
@@ -458,7 +463,7 @@
                   <a:bodyPr/>
                   <a:lstStyle/>
                   <a:p>
-                    <a:fld id="{BFBD075D-F8B2-4EC4-8EF8-6F177D5D2057}" type="CELLRANGE">
+                    <a:fld id="{EF7B5BA2-380B-47BA-B2B6-14F8E8843607}" type="CELLRANGE">
                       <a:rPr lang="ru-RU"/>
                       <a:pPr/>
                       <a:t>[ДИАПАЗОН ЯЧЕЕК]</a:t>
@@ -527,12 +532,9 @@
               <a:lstStyle/>
               <a:p>
                 <a:pPr>
-                  <a:defRPr sz="1197" b="0" i="0" u="none" strike="noStrike" kern="1200" baseline="0">
+                  <a:defRPr sz="2400" b="0" i="0" u="none" strike="noStrike" kern="1200" baseline="0">
                     <a:solidFill>
-                      <a:schemeClr val="tx1">
-                        <a:lumMod val="75000"/>
-                        <a:lumOff val="25000"/>
-                      </a:schemeClr>
+                      <a:schemeClr val="tx1"/>
                     </a:solidFill>
                     <a:latin typeface="+mn-lt"/>
                     <a:ea typeface="+mn-ea"/>
@@ -621,10 +623,7 @@
               <a:noFill/>
               <a:ln w="38100" cap="flat" cmpd="sng" algn="ctr">
                 <a:solidFill>
-                  <a:schemeClr val="tx1">
-                    <a:lumMod val="65000"/>
-                    <a:lumOff val="35000"/>
-                  </a:schemeClr>
+                  <a:schemeClr val="tx1"/>
                 </a:solidFill>
                 <a:round/>
                 <a:headEnd type="triangle"/>
@@ -744,12 +743,9 @@
           <a:lstStyle/>
           <a:p>
             <a:pPr>
-              <a:defRPr sz="1197" b="0" i="0" u="none" strike="noStrike" kern="1200" baseline="0">
+              <a:defRPr sz="2000" b="0" i="0" u="none" strike="noStrike" kern="1200" baseline="0">
                 <a:solidFill>
-                  <a:schemeClr val="tx1">
-                    <a:lumMod val="65000"/>
-                    <a:lumOff val="35000"/>
-                  </a:schemeClr>
+                  <a:schemeClr val="tx1"/>
                 </a:solidFill>
                 <a:latin typeface="+mn-lt"/>
                 <a:ea typeface="+mn-ea"/>
@@ -771,34 +767,9 @@
         <c:scaling>
           <c:orientation val="minMax"/>
         </c:scaling>
-        <c:delete val="0"/>
+        <c:delete val="1"/>
         <c:axPos val="l"/>
         <c:title>
-          <c:tx>
-            <c:rich>
-              <a:bodyPr rot="-5400000" spcFirstLastPara="1" vertOverflow="ellipsis" vert="horz" wrap="square" anchor="ctr" anchorCtr="1"/>
-              <a:lstStyle/>
-              <a:p>
-                <a:pPr>
-                  <a:defRPr sz="1330" b="0" i="0" u="none" strike="noStrike" kern="1200" baseline="0">
-                    <a:solidFill>
-                      <a:schemeClr val="tx1">
-                        <a:lumMod val="65000"/>
-                        <a:lumOff val="35000"/>
-                      </a:schemeClr>
-                    </a:solidFill>
-                    <a:latin typeface="+mn-lt"/>
-                    <a:ea typeface="+mn-ea"/>
-                    <a:cs typeface="+mn-cs"/>
-                  </a:defRPr>
-                </a:pPr>
-                <a:r>
-                  <a:rPr lang="ru-RU" dirty="0"/>
-                  <a:t>Трлн рублей</a:t>
-                </a:r>
-              </a:p>
-            </c:rich>
-          </c:tx>
           <c:overlay val="0"/>
           <c:spPr>
             <a:noFill/>
@@ -812,12 +783,9 @@
             <a:lstStyle/>
             <a:p>
               <a:pPr>
-                <a:defRPr sz="1330" b="0" i="0" u="none" strike="noStrike" kern="1200" baseline="0">
+                <a:defRPr sz="2000" b="0" i="0" u="none" strike="noStrike" kern="1200" baseline="0">
                   <a:solidFill>
-                    <a:schemeClr val="tx1">
-                      <a:lumMod val="65000"/>
-                      <a:lumOff val="35000"/>
-                    </a:schemeClr>
+                    <a:schemeClr val="tx1"/>
                   </a:solidFill>
                   <a:latin typeface="+mn-lt"/>
                   <a:ea typeface="+mn-ea"/>
@@ -832,33 +800,6 @@
         <c:majorTickMark val="none"/>
         <c:minorTickMark val="none"/>
         <c:tickLblPos val="nextTo"/>
-        <c:spPr>
-          <a:noFill/>
-          <a:ln>
-            <a:noFill/>
-          </a:ln>
-          <a:effectLst/>
-        </c:spPr>
-        <c:txPr>
-          <a:bodyPr rot="-60000000" spcFirstLastPara="1" vertOverflow="ellipsis" vert="horz" wrap="square" anchor="ctr" anchorCtr="1"/>
-          <a:lstStyle/>
-          <a:p>
-            <a:pPr>
-              <a:defRPr sz="1197" b="0" i="0" u="none" strike="noStrike" kern="1200" baseline="0">
-                <a:solidFill>
-                  <a:schemeClr val="tx1">
-                    <a:lumMod val="65000"/>
-                    <a:lumOff val="35000"/>
-                  </a:schemeClr>
-                </a:solidFill>
-                <a:latin typeface="+mn-lt"/>
-                <a:ea typeface="+mn-ea"/>
-                <a:cs typeface="+mn-cs"/>
-              </a:defRPr>
-            </a:pPr>
-            <a:endParaRPr lang="ru-RU"/>
-          </a:p>
-        </c:txPr>
         <c:crossAx val="413314703"/>
         <c:crosses val="autoZero"/>
         <c:crossBetween val="between"/>
@@ -928,10 +869,7 @@
             <a:pPr>
               <a:defRPr sz="1862" b="0" i="0" u="none" strike="noStrike" kern="1200" spc="0" baseline="0">
                 <a:solidFill>
-                  <a:schemeClr val="tx1">
-                    <a:lumMod val="65000"/>
-                    <a:lumOff val="35000"/>
-                  </a:schemeClr>
+                  <a:schemeClr val="tx1"/>
                 </a:solidFill>
                 <a:latin typeface="+mn-lt"/>
                 <a:ea typeface="+mn-ea"/>
@@ -939,7 +877,11 @@
               </a:defRPr>
             </a:pPr>
             <a:r>
-              <a:rPr lang="ru-RU" dirty="0"/>
+              <a:rPr lang="ru-RU" sz="3200" dirty="0">
+                <a:solidFill>
+                  <a:schemeClr val="tx1"/>
+                </a:solidFill>
+              </a:rPr>
               <a:t>Число потребителей</a:t>
             </a:r>
           </a:p>
@@ -960,10 +902,7 @@
           <a:pPr>
             <a:defRPr sz="1862" b="0" i="0" u="none" strike="noStrike" kern="1200" spc="0" baseline="0">
               <a:solidFill>
-                <a:schemeClr val="tx1">
-                  <a:lumMod val="65000"/>
-                  <a:lumOff val="35000"/>
-                </a:schemeClr>
+                <a:schemeClr val="tx1"/>
               </a:solidFill>
               <a:latin typeface="+mn-lt"/>
               <a:ea typeface="+mn-ea"/>
@@ -976,7 +915,17 @@
     </c:title>
     <c:autoTitleDeleted val="0"/>
     <c:plotArea>
-      <c:layout/>
+      <c:layout>
+        <c:manualLayout>
+          <c:layoutTarget val="inner"/>
+          <c:xMode val="edge"/>
+          <c:yMode val="edge"/>
+          <c:x val="4.7417391603342157E-2"/>
+          <c:y val="0.25175960652918689"/>
+          <c:w val="0.93885834139728164"/>
+          <c:h val="0.61135095690190422"/>
+        </c:manualLayout>
+      </c:layout>
       <c:barChart>
         <c:barDir val="col"/>
         <c:grouping val="clustered"/>
@@ -986,7 +935,7 @@
           <c:order val="0"/>
           <c:spPr>
             <a:solidFill>
-              <a:schemeClr val="accent1"/>
+              <a:schemeClr val="tx1"/>
             </a:solidFill>
             <a:ln>
               <a:noFill/>
@@ -1009,12 +958,9 @@
               <a:lstStyle/>
               <a:p>
                 <a:pPr>
-                  <a:defRPr sz="1197" b="0" i="0" u="none" strike="noStrike" kern="1200" baseline="0">
+                  <a:defRPr sz="2400" b="0" i="0" u="none" strike="noStrike" kern="1200" baseline="0">
                     <a:solidFill>
-                      <a:schemeClr val="tx1">
-                        <a:lumMod val="75000"/>
-                        <a:lumOff val="25000"/>
-                      </a:schemeClr>
+                      <a:schemeClr val="tx1"/>
                     </a:solidFill>
                     <a:latin typeface="+mn-lt"/>
                     <a:ea typeface="+mn-ea"/>
@@ -1124,7 +1070,7 @@
                   <a:bodyPr/>
                   <a:lstStyle/>
                   <a:p>
-                    <a:fld id="{3D1CBAD9-F644-4399-BB32-1F4B1218610A}" type="CELLRANGE">
+                    <a:fld id="{57F2EE29-CAF7-4959-B0FC-6FC8FA9101F5}" type="CELLRANGE">
                       <a:rPr lang="en-US"/>
                       <a:pPr/>
                       <a:t>[ДИАПАЗОН ЯЧЕЕК]</a:t>
@@ -1157,7 +1103,7 @@
                   <a:bodyPr/>
                   <a:lstStyle/>
                   <a:p>
-                    <a:fld id="{95DD3570-2B51-4EFB-A159-B4BBA7BF44B2}" type="CELLRANGE">
+                    <a:fld id="{F0789DFC-37C6-4640-A34F-BB137D98023D}" type="CELLRANGE">
                       <a:rPr lang="en-US"/>
                       <a:pPr/>
                       <a:t>[ДИАПАЗОН ЯЧЕЕК]</a:t>
@@ -1190,7 +1136,7 @@
                   <a:bodyPr/>
                   <a:lstStyle/>
                   <a:p>
-                    <a:fld id="{8D0AE45C-282E-43E9-9127-6C3036854EB7}" type="CELLRANGE">
+                    <a:fld id="{EE5E34CE-F7CD-48DD-AC89-B20777D53693}" type="CELLRANGE">
                       <a:rPr lang="ru-RU"/>
                       <a:pPr/>
                       <a:t>[ДИАПАЗОН ЯЧЕЕК]</a:t>
@@ -1224,7 +1170,7 @@
                   <a:bodyPr/>
                   <a:lstStyle/>
                   <a:p>
-                    <a:fld id="{D78F6B6E-0BC5-44C4-BC1E-8525CDE9F28F}" type="CELLRANGE">
+                    <a:fld id="{5444D8F5-6D5B-48B9-8904-B9B709BB5C9E}" type="CELLRANGE">
                       <a:rPr lang="ru-RU"/>
                       <a:pPr/>
                       <a:t>[ДИАПАЗОН ЯЧЕЕК]</a:t>
@@ -1293,12 +1239,9 @@
               <a:lstStyle/>
               <a:p>
                 <a:pPr>
-                  <a:defRPr sz="1197" b="0" i="0" u="none" strike="noStrike" kern="1200" baseline="0">
+                  <a:defRPr sz="2400" b="0" i="0" u="none" strike="noStrike" kern="1200" baseline="0">
                     <a:solidFill>
-                      <a:schemeClr val="tx1">
-                        <a:lumMod val="75000"/>
-                        <a:lumOff val="25000"/>
-                      </a:schemeClr>
+                      <a:schemeClr val="tx1"/>
                     </a:solidFill>
                     <a:latin typeface="+mn-lt"/>
                     <a:ea typeface="+mn-ea"/>
@@ -1387,10 +1330,7 @@
               <a:noFill/>
               <a:ln w="38100" cap="flat" cmpd="sng" algn="ctr">
                 <a:solidFill>
-                  <a:schemeClr val="tx1">
-                    <a:lumMod val="65000"/>
-                    <a:lumOff val="35000"/>
-                  </a:schemeClr>
+                  <a:schemeClr val="tx1"/>
                 </a:solidFill>
                 <a:round/>
                 <a:headEnd type="triangle"/>
@@ -1489,7 +1429,7 @@
         <c:delete val="0"/>
         <c:axPos val="b"/>
         <c:numFmt formatCode="General" sourceLinked="1"/>
-        <c:majorTickMark val="none"/>
+        <c:majorTickMark val="out"/>
         <c:minorTickMark val="none"/>
         <c:tickLblPos val="nextTo"/>
         <c:spPr>
@@ -1510,12 +1450,9 @@
           <a:lstStyle/>
           <a:p>
             <a:pPr>
-              <a:defRPr sz="1197" b="0" i="0" u="none" strike="noStrike" kern="1200" baseline="0">
+              <a:defRPr sz="2000" b="0" i="0" u="none" strike="noStrike" kern="1200" baseline="0">
                 <a:solidFill>
-                  <a:schemeClr val="tx1">
-                    <a:lumMod val="65000"/>
-                    <a:lumOff val="35000"/>
-                  </a:schemeClr>
+                  <a:schemeClr val="tx1"/>
                 </a:solidFill>
                 <a:latin typeface="+mn-lt"/>
                 <a:ea typeface="+mn-ea"/>
@@ -1537,7 +1474,7 @@
         <c:scaling>
           <c:orientation val="minMax"/>
         </c:scaling>
-        <c:delete val="0"/>
+        <c:delete val="1"/>
         <c:axPos val="l"/>
         <c:title>
           <c:tx>
@@ -1546,12 +1483,9 @@
               <a:lstStyle/>
               <a:p>
                 <a:pPr>
-                  <a:defRPr sz="1330" b="0" i="0" u="none" strike="noStrike" kern="1200" baseline="0">
+                  <a:defRPr sz="2000" b="0" i="0" u="none" strike="noStrike" kern="1200" baseline="0">
                     <a:solidFill>
-                      <a:schemeClr val="tx1">
-                        <a:lumMod val="65000"/>
-                        <a:lumOff val="35000"/>
-                      </a:schemeClr>
+                      <a:schemeClr val="tx1"/>
                     </a:solidFill>
                     <a:latin typeface="+mn-lt"/>
                     <a:ea typeface="+mn-ea"/>
@@ -1559,7 +1493,11 @@
                   </a:defRPr>
                 </a:pPr>
                 <a:r>
-                  <a:rPr lang="ru-RU" dirty="0"/>
+                  <a:rPr lang="ru-RU" sz="2000" dirty="0">
+                    <a:solidFill>
+                      <a:schemeClr val="tx1"/>
+                    </a:solidFill>
+                  </a:rPr>
                   <a:t>Млн человек</a:t>
                 </a:r>
               </a:p>
@@ -1578,12 +1516,9 @@
             <a:lstStyle/>
             <a:p>
               <a:pPr>
-                <a:defRPr sz="1330" b="0" i="0" u="none" strike="noStrike" kern="1200" baseline="0">
+                <a:defRPr sz="2000" b="0" i="0" u="none" strike="noStrike" kern="1200" baseline="0">
                   <a:solidFill>
-                    <a:schemeClr val="tx1">
-                      <a:lumMod val="65000"/>
-                      <a:lumOff val="35000"/>
-                    </a:schemeClr>
+                    <a:schemeClr val="tx1"/>
                   </a:solidFill>
                   <a:latin typeface="+mn-lt"/>
                   <a:ea typeface="+mn-ea"/>
@@ -1595,36 +1530,9 @@
           </c:txPr>
         </c:title>
         <c:numFmt formatCode="General" sourceLinked="1"/>
-        <c:majorTickMark val="none"/>
+        <c:majorTickMark val="out"/>
         <c:minorTickMark val="none"/>
         <c:tickLblPos val="nextTo"/>
-        <c:spPr>
-          <a:noFill/>
-          <a:ln>
-            <a:noFill/>
-          </a:ln>
-          <a:effectLst/>
-        </c:spPr>
-        <c:txPr>
-          <a:bodyPr rot="-60000000" spcFirstLastPara="1" vertOverflow="ellipsis" vert="horz" wrap="square" anchor="ctr" anchorCtr="1"/>
-          <a:lstStyle/>
-          <a:p>
-            <a:pPr>
-              <a:defRPr sz="1197" b="0" i="0" u="none" strike="noStrike" kern="1200" baseline="0">
-                <a:solidFill>
-                  <a:schemeClr val="tx1">
-                    <a:lumMod val="65000"/>
-                    <a:lumOff val="35000"/>
-                  </a:schemeClr>
-                </a:solidFill>
-                <a:latin typeface="+mn-lt"/>
-                <a:ea typeface="+mn-ea"/>
-                <a:cs typeface="+mn-cs"/>
-              </a:defRPr>
-            </a:pPr>
-            <a:endParaRPr lang="ru-RU"/>
-          </a:p>
-        </c:txPr>
         <c:crossAx val="413314703"/>
         <c:crosses val="autoZero"/>
         <c:crossBetween val="between"/>
@@ -1692,12 +1600,9 @@
           <a:lstStyle/>
           <a:p>
             <a:pPr>
-              <a:defRPr sz="1862" b="0" i="0" u="none" strike="noStrike" kern="1200" spc="0" baseline="0">
+              <a:defRPr sz="3200" b="0" i="0" u="none" strike="noStrike" kern="1200" spc="0" baseline="0">
                 <a:solidFill>
-                  <a:schemeClr val="tx1">
-                    <a:lumMod val="65000"/>
-                    <a:lumOff val="35000"/>
-                  </a:schemeClr>
+                  <a:schemeClr val="tx1"/>
                 </a:solidFill>
                 <a:latin typeface="+mn-lt"/>
                 <a:ea typeface="+mn-ea"/>
@@ -1705,7 +1610,11 @@
               </a:defRPr>
             </a:pPr>
             <a:r>
-              <a:rPr lang="ru-RU" dirty="0"/>
+              <a:rPr lang="ru-RU" sz="3200" dirty="0">
+                <a:solidFill>
+                  <a:schemeClr val="tx1"/>
+                </a:solidFill>
+              </a:rPr>
               <a:t>Создание брони</a:t>
             </a:r>
           </a:p>
@@ -1724,12 +1633,9 @@
         <a:lstStyle/>
         <a:p>
           <a:pPr>
-            <a:defRPr sz="1862" b="0" i="0" u="none" strike="noStrike" kern="1200" spc="0" baseline="0">
+            <a:defRPr sz="3200" b="0" i="0" u="none" strike="noStrike" kern="1200" spc="0" baseline="0">
               <a:solidFill>
-                <a:schemeClr val="tx1">
-                  <a:lumMod val="65000"/>
-                  <a:lumOff val="35000"/>
-                </a:schemeClr>
+                <a:schemeClr val="tx1"/>
               </a:solidFill>
               <a:latin typeface="+mn-lt"/>
               <a:ea typeface="+mn-ea"/>
@@ -1742,7 +1648,17 @@
     </c:title>
     <c:autoTitleDeleted val="0"/>
     <c:plotArea>
-      <c:layout/>
+      <c:layout>
+        <c:manualLayout>
+          <c:layoutTarget val="inner"/>
+          <c:xMode val="edge"/>
+          <c:yMode val="edge"/>
+          <c:x val="4.7417391603342157E-2"/>
+          <c:y val="0.14713064240586202"/>
+          <c:w val="0.93885834139728164"/>
+          <c:h val="0.71597992102522912"/>
+        </c:manualLayout>
+      </c:layout>
       <c:barChart>
         <c:barDir val="col"/>
         <c:grouping val="clustered"/>
@@ -1752,7 +1668,7 @@
           <c:order val="0"/>
           <c:spPr>
             <a:solidFill>
-              <a:schemeClr val="accent1"/>
+              <a:schemeClr val="tx1"/>
             </a:solidFill>
             <a:ln>
               <a:noFill/>
@@ -1775,12 +1691,9 @@
               <a:lstStyle/>
               <a:p>
                 <a:pPr>
-                  <a:defRPr sz="1197" b="0" i="0" u="none" strike="noStrike" kern="1200" baseline="0">
+                  <a:defRPr sz="2400" b="0" i="0" u="none" strike="noStrike" kern="1200" baseline="0">
                     <a:solidFill>
-                      <a:schemeClr val="tx1">
-                        <a:lumMod val="75000"/>
-                        <a:lumOff val="25000"/>
-                      </a:schemeClr>
+                      <a:schemeClr val="tx1"/>
                     </a:solidFill>
                     <a:latin typeface="+mn-lt"/>
                     <a:ea typeface="+mn-ea"/>
@@ -1910,7 +1823,7 @@
                   <a:bodyPr/>
                   <a:lstStyle/>
                   <a:p>
-                    <a:fld id="{5F8ECAD0-B256-419A-8411-0CC8D4E8DA5F}" type="CELLRANGE">
+                    <a:fld id="{0D6E1053-FDF8-4C0C-90A8-F68A7DA7021E}" type="CELLRANGE">
                       <a:rPr lang="ru-RU"/>
                       <a:pPr/>
                       <a:t>[ДИАПАЗОН ЯЧЕЕК]</a:t>
@@ -1979,12 +1892,9 @@
               <a:lstStyle/>
               <a:p>
                 <a:pPr>
-                  <a:defRPr sz="1197" b="0" i="0" u="none" strike="noStrike" kern="1200" baseline="0">
+                  <a:defRPr sz="2400" b="0" i="0" u="none" strike="noStrike" kern="1200" baseline="0">
                     <a:solidFill>
-                      <a:schemeClr val="tx1">
-                        <a:lumMod val="75000"/>
-                        <a:lumOff val="25000"/>
-                      </a:schemeClr>
+                      <a:schemeClr val="tx1"/>
                     </a:solidFill>
                     <a:latin typeface="+mn-lt"/>
                     <a:ea typeface="+mn-ea"/>
@@ -2061,10 +1971,7 @@
               <a:noFill/>
               <a:ln w="38100" cap="flat" cmpd="sng" algn="ctr">
                 <a:solidFill>
-                  <a:schemeClr val="tx1">
-                    <a:lumMod val="65000"/>
-                    <a:lumOff val="35000"/>
-                  </a:schemeClr>
+                  <a:schemeClr val="tx1"/>
                 </a:solidFill>
                 <a:round/>
                 <a:headEnd type="triangle"/>
@@ -2165,12 +2072,9 @@
           <a:lstStyle/>
           <a:p>
             <a:pPr>
-              <a:defRPr sz="1197" b="0" i="0" u="none" strike="noStrike" kern="1200" baseline="0">
+              <a:defRPr sz="2000" b="0" i="0" u="none" strike="noStrike" kern="1200" baseline="0">
                 <a:solidFill>
-                  <a:schemeClr val="tx1">
-                    <a:lumMod val="65000"/>
-                    <a:lumOff val="35000"/>
-                  </a:schemeClr>
+                  <a:schemeClr val="tx1"/>
                 </a:solidFill>
                 <a:latin typeface="+mn-lt"/>
                 <a:ea typeface="+mn-ea"/>
@@ -2193,7 +2097,7 @@
         <c:scaling>
           <c:orientation val="minMax"/>
         </c:scaling>
-        <c:delete val="0"/>
+        <c:delete val="1"/>
         <c:axPos val="l"/>
         <c:title>
           <c:tx>
@@ -2202,12 +2106,9 @@
               <a:lstStyle/>
               <a:p>
                 <a:pPr>
-                  <a:defRPr sz="1330" b="0" i="0" u="none" strike="noStrike" kern="1200" baseline="0">
+                  <a:defRPr sz="2000" b="0" i="0" u="none" strike="noStrike" kern="1200" baseline="0">
                     <a:solidFill>
-                      <a:schemeClr val="tx1">
-                        <a:lumMod val="65000"/>
-                        <a:lumOff val="35000"/>
-                      </a:schemeClr>
+                      <a:schemeClr val="tx1"/>
                     </a:solidFill>
                     <a:latin typeface="+mn-lt"/>
                     <a:ea typeface="+mn-ea"/>
@@ -2215,7 +2116,11 @@
                   </a:defRPr>
                 </a:pPr>
                 <a:r>
-                  <a:rPr lang="ru-RU" dirty="0"/>
+                  <a:rPr lang="ru-RU" sz="2000" dirty="0">
+                    <a:solidFill>
+                      <a:schemeClr val="tx1"/>
+                    </a:solidFill>
+                  </a:rPr>
                   <a:t>Пользователи</a:t>
                 </a:r>
               </a:p>
@@ -2234,12 +2139,9 @@
             <a:lstStyle/>
             <a:p>
               <a:pPr>
-                <a:defRPr sz="1330" b="0" i="0" u="none" strike="noStrike" kern="1200" baseline="0">
+                <a:defRPr sz="2000" b="0" i="0" u="none" strike="noStrike" kern="1200" baseline="0">
                   <a:solidFill>
-                    <a:schemeClr val="tx1">
-                      <a:lumMod val="65000"/>
-                      <a:lumOff val="35000"/>
-                    </a:schemeClr>
+                    <a:schemeClr val="tx1"/>
                   </a:solidFill>
                   <a:latin typeface="+mn-lt"/>
                   <a:ea typeface="+mn-ea"/>
@@ -2254,33 +2156,6 @@
         <c:majorTickMark val="none"/>
         <c:minorTickMark val="none"/>
         <c:tickLblPos val="nextTo"/>
-        <c:spPr>
-          <a:noFill/>
-          <a:ln>
-            <a:noFill/>
-          </a:ln>
-          <a:effectLst/>
-        </c:spPr>
-        <c:txPr>
-          <a:bodyPr rot="-60000000" spcFirstLastPara="1" vertOverflow="ellipsis" vert="horz" wrap="square" anchor="ctr" anchorCtr="1"/>
-          <a:lstStyle/>
-          <a:p>
-            <a:pPr>
-              <a:defRPr sz="1197" b="0" i="0" u="none" strike="noStrike" kern="1200" baseline="0">
-                <a:solidFill>
-                  <a:schemeClr val="tx1">
-                    <a:lumMod val="65000"/>
-                    <a:lumOff val="35000"/>
-                  </a:schemeClr>
-                </a:solidFill>
-                <a:latin typeface="+mn-lt"/>
-                <a:ea typeface="+mn-ea"/>
-                <a:cs typeface="+mn-cs"/>
-              </a:defRPr>
-            </a:pPr>
-            <a:endParaRPr lang="ru-RU"/>
-          </a:p>
-        </c:txPr>
         <c:crossAx val="413314703"/>
         <c:crosses val="autoZero"/>
         <c:crossBetween val="between"/>
@@ -4038,7 +3913,7 @@
           <a:p>
             <a:fld id="{90ABE644-5DA6-4F42-9056-5E70F70D6CF2}" type="datetimeFigureOut">
               <a:rPr lang="ru-RU" smtClean="0"/>
-              <a:t>29.05.2024</a:t>
+              <a:t>31.05.2024</a:t>
             </a:fld>
             <a:endParaRPr lang="ru-RU"/>
           </a:p>
@@ -6828,7 +6703,7 @@
           <a:p>
             <a:fld id="{B2D52420-6A92-4DC2-8591-889C8603F9D7}" type="datetime1">
               <a:rPr lang="ru-RU" smtClean="0"/>
-              <a:t>29.05.2024</a:t>
+              <a:t>31.05.2024</a:t>
             </a:fld>
             <a:endParaRPr lang="ru-RU"/>
           </a:p>
@@ -7093,7 +6968,7 @@
           <a:p>
             <a:fld id="{AFC6059B-B3EB-47F3-8BC6-5CF7158CCF5E}" type="datetime1">
               <a:rPr lang="ru-RU" smtClean="0"/>
-              <a:t>29.05.2024</a:t>
+              <a:t>31.05.2024</a:t>
             </a:fld>
             <a:endParaRPr lang="ru-RU"/>
           </a:p>
@@ -7295,7 +7170,7 @@
           <a:p>
             <a:fld id="{672DA8F7-9E1C-4330-89D8-5ACAE3F4BA4B}" type="datetime1">
               <a:rPr lang="ru-RU" smtClean="0"/>
-              <a:t>29.05.2024</a:t>
+              <a:t>31.05.2024</a:t>
             </a:fld>
             <a:endParaRPr lang="ru-RU"/>
           </a:p>
@@ -7497,7 +7372,7 @@
           <a:p>
             <a:fld id="{F4997B83-498B-4930-8185-A988F003D33A}" type="datetime1">
               <a:rPr lang="ru-RU" smtClean="0"/>
-              <a:t>29.05.2024</a:t>
+              <a:t>31.05.2024</a:t>
             </a:fld>
             <a:endParaRPr lang="ru-RU"/>
           </a:p>
@@ -7790,7 +7665,7 @@
           <a:p>
             <a:fld id="{3ABD95BC-C76F-444E-B3FB-BD27E4F798B7}" type="datetime1">
               <a:rPr lang="ru-RU" smtClean="0"/>
-              <a:t>29.05.2024</a:t>
+              <a:t>31.05.2024</a:t>
             </a:fld>
             <a:endParaRPr lang="ru-RU"/>
           </a:p>
@@ -9023,7 +8898,7 @@
           <a:p>
             <a:fld id="{E13DA6AE-AB60-4652-AB2E-D952392D1655}" type="datetime1">
               <a:rPr lang="ru-RU" smtClean="0"/>
-              <a:t>29.05.2024</a:t>
+              <a:t>31.05.2024</a:t>
             </a:fld>
             <a:endParaRPr lang="ru-RU"/>
           </a:p>
@@ -9444,7 +9319,7 @@
           <a:p>
             <a:fld id="{5E0F9A4F-E2CF-4D07-BEAB-A6631996DDD1}" type="datetime1">
               <a:rPr lang="ru-RU" smtClean="0"/>
-              <a:t>29.05.2024</a:t>
+              <a:t>31.05.2024</a:t>
             </a:fld>
             <a:endParaRPr lang="ru-RU"/>
           </a:p>
@@ -9591,7 +9466,7 @@
           <a:p>
             <a:fld id="{06D2A858-6E04-484B-9C45-539F27E3937C}" type="datetime1">
               <a:rPr lang="ru-RU" smtClean="0"/>
-              <a:t>29.05.2024</a:t>
+              <a:t>31.05.2024</a:t>
             </a:fld>
             <a:endParaRPr lang="ru-RU"/>
           </a:p>
@@ -9702,7 +9577,7 @@
           <a:p>
             <a:fld id="{AC6B3F91-F2E8-4402-9B00-8213E0D61D50}" type="datetime1">
               <a:rPr lang="ru-RU" smtClean="0"/>
-              <a:t>29.05.2024</a:t>
+              <a:t>31.05.2024</a:t>
             </a:fld>
             <a:endParaRPr lang="ru-RU"/>
           </a:p>
@@ -10485,7 +10360,7 @@
           <a:p>
             <a:fld id="{50FCF844-36E3-4D2D-9EE0-8615F370CF07}" type="datetime1">
               <a:rPr lang="ru-RU" smtClean="0"/>
-              <a:t>29.05.2024</a:t>
+              <a:t>31.05.2024</a:t>
             </a:fld>
             <a:endParaRPr lang="ru-RU"/>
           </a:p>
@@ -11342,7 +11217,7 @@
           <a:p>
             <a:fld id="{8C256B46-112F-45DA-B602-9179791C6F92}" type="datetime1">
               <a:rPr lang="ru-RU" smtClean="0"/>
-              <a:t>29.05.2024</a:t>
+              <a:t>31.05.2024</a:t>
             </a:fld>
             <a:endParaRPr lang="ru-RU"/>
           </a:p>
@@ -12133,7 +12008,7 @@
           <a:p>
             <a:fld id="{629052EF-D6AA-42E2-9131-813E79594612}" type="datetimeFigureOut">
               <a:rPr lang="ru-RU" smtClean="0"/>
-              <a:t>29.05.2024</a:t>
+              <a:t>31.05.2024</a:t>
             </a:fld>
             <a:endParaRPr lang="ru-RU"/>
           </a:p>
@@ -14212,14 +14087,14 @@
             <p:ph idx="1"/>
             <p:extLst>
               <p:ext uri="{D42A27DB-BD31-4B8C-83A1-F6EECF244321}">
-                <p14:modId xmlns:p14="http://schemas.microsoft.com/office/powerpoint/2010/main" val="991476062"/>
+                <p14:modId xmlns:p14="http://schemas.microsoft.com/office/powerpoint/2010/main" val="3518096977"/>
               </p:ext>
             </p:extLst>
           </p:nvPr>
         </p:nvGraphicFramePr>
         <p:xfrm>
-          <a:off x="1250950" y="2286000"/>
-          <a:ext cx="10179050" cy="3594100"/>
+          <a:off x="1250950" y="1874517"/>
+          <a:ext cx="10179050" cy="4005583"/>
         </p:xfrm>
         <a:graphic>
           <a:graphicData uri="http://schemas.openxmlformats.org/drawingml/2006/chart">
@@ -14330,14 +14205,14 @@
             <p:ph idx="1"/>
             <p:extLst>
               <p:ext uri="{D42A27DB-BD31-4B8C-83A1-F6EECF244321}">
-                <p14:modId xmlns:p14="http://schemas.microsoft.com/office/powerpoint/2010/main" val="1287067408"/>
+                <p14:modId xmlns:p14="http://schemas.microsoft.com/office/powerpoint/2010/main" val="2904928980"/>
               </p:ext>
             </p:extLst>
           </p:nvPr>
         </p:nvGraphicFramePr>
         <p:xfrm>
-          <a:off x="1250950" y="2286000"/>
-          <a:ext cx="10179050" cy="3594100"/>
+          <a:off x="1250950" y="1874517"/>
+          <a:ext cx="10179050" cy="4005583"/>
         </p:xfrm>
         <a:graphic>
           <a:graphicData uri="http://schemas.openxmlformats.org/drawingml/2006/chart">
@@ -15092,14 +14967,14 @@
           <p:nvPr>
             <p:extLst>
               <p:ext uri="{D42A27DB-BD31-4B8C-83A1-F6EECF244321}">
-                <p14:modId xmlns:p14="http://schemas.microsoft.com/office/powerpoint/2010/main" val="2031482524"/>
+                <p14:modId xmlns:p14="http://schemas.microsoft.com/office/powerpoint/2010/main" val="397506339"/>
               </p:ext>
             </p:extLst>
           </p:nvPr>
         </p:nvGraphicFramePr>
         <p:xfrm>
-          <a:off x="1250950" y="2286000"/>
-          <a:ext cx="10179050" cy="3594100"/>
+          <a:off x="1250950" y="1874517"/>
+          <a:ext cx="10179050" cy="4005583"/>
         </p:xfrm>
         <a:graphic>
           <a:graphicData uri="http://schemas.openxmlformats.org/drawingml/2006/chart">

</xml_diff>

<commit_message>
doc: add price detalization slide
</commit_message>
<xml_diff>
--- a/presentation (product)/Restobook.pptx
+++ b/presentation (product)/Restobook.pptx
@@ -5,7 +5,7 @@
     <p:sldMasterId id="2147483687" r:id="rId1"/>
   </p:sldMasterIdLst>
   <p:notesMasterIdLst>
-    <p:notesMasterId r:id="rId15"/>
+    <p:notesMasterId r:id="rId16"/>
   </p:notesMasterIdLst>
   <p:sldIdLst>
     <p:sldId id="256" r:id="rId2"/>
@@ -17,10 +17,11 @@
     <p:sldId id="274" r:id="rId8"/>
     <p:sldId id="279" r:id="rId9"/>
     <p:sldId id="267" r:id="rId10"/>
-    <p:sldId id="276" r:id="rId11"/>
-    <p:sldId id="270" r:id="rId12"/>
-    <p:sldId id="275" r:id="rId13"/>
-    <p:sldId id="264" r:id="rId14"/>
+    <p:sldId id="281" r:id="rId11"/>
+    <p:sldId id="276" r:id="rId12"/>
+    <p:sldId id="270" r:id="rId13"/>
+    <p:sldId id="275" r:id="rId14"/>
+    <p:sldId id="264" r:id="rId15"/>
   </p:sldIdLst>
   <p:sldSz cx="12192000" cy="6858000"/>
   <p:notesSz cx="6858000" cy="9144000"/>
@@ -362,7 +363,7 @@
                   <a:bodyPr/>
                   <a:lstStyle/>
                   <a:p>
-                    <a:fld id="{2842E369-3A59-4C36-8CED-220F7E6362F5}" type="CELLRANGE">
+                    <a:fld id="{29CE9A72-BCA1-4D47-8178-BF6F0E50EB10}" type="CELLRANGE">
                       <a:rPr lang="en-US"/>
                       <a:pPr/>
                       <a:t>[ДИАПАЗОН ЯЧЕЕК]</a:t>
@@ -395,7 +396,7 @@
                   <a:bodyPr/>
                   <a:lstStyle/>
                   <a:p>
-                    <a:fld id="{211764EB-0317-456A-90F3-ED5210C56887}" type="CELLRANGE">
+                    <a:fld id="{F1A96954-62FC-4335-9FE2-67075CADC7E5}" type="CELLRANGE">
                       <a:rPr lang="ru-RU"/>
                       <a:pPr/>
                       <a:t>[ДИАПАЗОН ЯЧЕЕК]</a:t>
@@ -429,7 +430,7 @@
                   <a:bodyPr/>
                   <a:lstStyle/>
                   <a:p>
-                    <a:fld id="{13F902FD-7A65-48D2-B537-8BE356FDBF3B}" type="CELLRANGE">
+                    <a:fld id="{1F073676-854C-4F05-806B-A5A717DE7FB8}" type="CELLRANGE">
                       <a:rPr lang="ru-RU"/>
                       <a:pPr/>
                       <a:t>[ДИАПАЗОН ЯЧЕЕК]</a:t>
@@ -463,7 +464,7 @@
                   <a:bodyPr/>
                   <a:lstStyle/>
                   <a:p>
-                    <a:fld id="{EF7B5BA2-380B-47BA-B2B6-14F8E8843607}" type="CELLRANGE">
+                    <a:fld id="{987F8FAB-11E2-4B1B-8F69-58931996C087}" type="CELLRANGE">
                       <a:rPr lang="ru-RU"/>
                       <a:pPr/>
                       <a:t>[ДИАПАЗОН ЯЧЕЕК]</a:t>
@@ -770,6 +771,37 @@
         <c:delete val="1"/>
         <c:axPos val="l"/>
         <c:title>
+          <c:tx>
+            <c:rich>
+              <a:bodyPr rot="-5400000" spcFirstLastPara="1" vertOverflow="ellipsis" vert="horz" wrap="square" anchor="ctr" anchorCtr="1"/>
+              <a:lstStyle/>
+              <a:p>
+                <a:pPr>
+                  <a:defRPr sz="2000" b="0" i="0" u="none" strike="noStrike" kern="1200" baseline="0">
+                    <a:solidFill>
+                      <a:schemeClr val="tx1"/>
+                    </a:solidFill>
+                    <a:latin typeface="+mn-lt"/>
+                    <a:ea typeface="+mn-ea"/>
+                    <a:cs typeface="+mn-cs"/>
+                  </a:defRPr>
+                </a:pPr>
+                <a:r>
+                  <a:rPr lang="ru-RU" dirty="0"/>
+                  <a:t>трлн</a:t>
+                </a:r>
+                <a:r>
+                  <a:rPr lang="ru-RU" baseline="0" dirty="0"/>
+                  <a:t> </a:t>
+                </a:r>
+                <a:r>
+                  <a:rPr lang="ru-RU" baseline="0" dirty="0" err="1"/>
+                  <a:t>руб</a:t>
+                </a:r>
+                <a:endParaRPr lang="ru-RU" dirty="0"/>
+              </a:p>
+            </c:rich>
+          </c:tx>
           <c:overlay val="0"/>
           <c:spPr>
             <a:noFill/>
@@ -1070,7 +1102,7 @@
                   <a:bodyPr/>
                   <a:lstStyle/>
                   <a:p>
-                    <a:fld id="{57F2EE29-CAF7-4959-B0FC-6FC8FA9101F5}" type="CELLRANGE">
+                    <a:fld id="{5D5AFE0A-957A-4B3E-85EA-328595241ED7}" type="CELLRANGE">
                       <a:rPr lang="en-US"/>
                       <a:pPr/>
                       <a:t>[ДИАПАЗОН ЯЧЕЕК]</a:t>
@@ -1103,7 +1135,7 @@
                   <a:bodyPr/>
                   <a:lstStyle/>
                   <a:p>
-                    <a:fld id="{F0789DFC-37C6-4640-A34F-BB137D98023D}" type="CELLRANGE">
+                    <a:fld id="{ADDB9B6A-74D5-458E-8ABD-839C6D6A51A8}" type="CELLRANGE">
                       <a:rPr lang="en-US"/>
                       <a:pPr/>
                       <a:t>[ДИАПАЗОН ЯЧЕЕК]</a:t>
@@ -1136,7 +1168,7 @@
                   <a:bodyPr/>
                   <a:lstStyle/>
                   <a:p>
-                    <a:fld id="{EE5E34CE-F7CD-48DD-AC89-B20777D53693}" type="CELLRANGE">
+                    <a:fld id="{17534AE4-2F9F-43A6-87C6-5137C366C476}" type="CELLRANGE">
                       <a:rPr lang="ru-RU"/>
                       <a:pPr/>
                       <a:t>[ДИАПАЗОН ЯЧЕЕК]</a:t>
@@ -1170,7 +1202,7 @@
                   <a:bodyPr/>
                   <a:lstStyle/>
                   <a:p>
-                    <a:fld id="{5444D8F5-6D5B-48B9-8904-B9B709BB5C9E}" type="CELLRANGE">
+                    <a:fld id="{8FF336F7-3945-4045-8724-E84514A12B8E}" type="CELLRANGE">
                       <a:rPr lang="ru-RU"/>
                       <a:pPr/>
                       <a:t>[ДИАПАЗОН ЯЧЕЕК]</a:t>
@@ -1617,6 +1649,19 @@
               </a:rPr>
               <a:t>Создание брони</a:t>
             </a:r>
+            <a:r>
+              <a:rPr lang="en-US" sz="3200" dirty="0">
+                <a:solidFill>
+                  <a:schemeClr val="tx1"/>
+                </a:solidFill>
+              </a:rPr>
+              <a:t> 21%</a:t>
+            </a:r>
+            <a:endParaRPr lang="ru-RU" sz="3200" dirty="0">
+              <a:solidFill>
+                <a:schemeClr val="tx1"/>
+              </a:solidFill>
+            </a:endParaRPr>
           </a:p>
         </c:rich>
       </c:tx>
@@ -1754,13 +1799,13 @@
                 <c:formatCode>General</c:formatCode>
                 <c:ptCount val="3"/>
                 <c:pt idx="0">
-                  <c:v>26</c:v>
+                  <c:v>37</c:v>
                 </c:pt>
                 <c:pt idx="1">
-                  <c:v>6</c:v>
+                  <c:v>12</c:v>
                 </c:pt>
                 <c:pt idx="2">
-                  <c:v>4</c:v>
+                  <c:v>8</c:v>
                 </c:pt>
               </c:numCache>
             </c:numRef>
@@ -1790,7 +1835,7 @@
                   <a:bodyPr/>
                   <a:lstStyle/>
                   <a:p>
-                    <a:fld id="{D7A934C2-286B-43B4-8F61-D1A1513E1E4D}" type="CELLRANGE">
+                    <a:fld id="{08F9CB16-8726-4C54-825D-10244AF655E1}" type="CELLRANGE">
                       <a:rPr lang="en-US"/>
                       <a:pPr/>
                       <a:t>[ДИАПАЗОН ЯЧЕЕК]</a:t>
@@ -1823,7 +1868,7 @@
                   <a:bodyPr/>
                   <a:lstStyle/>
                   <a:p>
-                    <a:fld id="{0D6E1053-FDF8-4C0C-90A8-F68A7DA7021E}" type="CELLRANGE">
+                    <a:fld id="{6C548B92-34BF-41AA-A84A-E4C299DD4772}" type="CELLRANGE">
                       <a:rPr lang="ru-RU"/>
                       <a:pPr/>
                       <a:t>[ДИАПАЗОН ЯЧЕЕК]</a:t>
@@ -1944,10 +1989,10 @@
                   <c:formatCode>General</c:formatCode>
                   <c:ptCount val="4"/>
                   <c:pt idx="0">
-                    <c:v>-20</c:v>
+                    <c:v>-25</c:v>
                   </c:pt>
                   <c:pt idx="1">
-                    <c:v>-2</c:v>
+                    <c:v>-4</c:v>
                   </c:pt>
                 </c:numCache>
               </c:numRef>
@@ -1959,10 +2004,10 @@
                   <c:formatCode>General</c:formatCode>
                   <c:ptCount val="4"/>
                   <c:pt idx="0">
-                    <c:v>-20</c:v>
+                    <c:v>-25</c:v>
                   </c:pt>
                   <c:pt idx="1">
-                    <c:v>-2</c:v>
+                    <c:v>-4</c:v>
                   </c:pt>
                 </c:numCache>
               </c:numRef>
@@ -2003,10 +2048,10 @@
                 <c:formatCode>General</c:formatCode>
                 <c:ptCount val="3"/>
                 <c:pt idx="0">
-                  <c:v>6</c:v>
+                  <c:v>12</c:v>
                 </c:pt>
                 <c:pt idx="1">
-                  <c:v>4</c:v>
+                  <c:v>8</c:v>
                 </c:pt>
               </c:numCache>
             </c:numRef>
@@ -2018,7 +2063,7 @@
                 <c15:dlblRangeCache>
                   <c:ptCount val="4"/>
                   <c:pt idx="0">
-                    <c:v>-77%</c:v>
+                    <c:v>-68%</c:v>
                   </c:pt>
                   <c:pt idx="1">
                     <c:v>-33%</c:v>
@@ -3913,7 +3958,7 @@
           <a:p>
             <a:fld id="{90ABE644-5DA6-4F42-9056-5E70F70D6CF2}" type="datetimeFigureOut">
               <a:rPr lang="ru-RU" smtClean="0"/>
-              <a:t>31.05.2024</a:t>
+              <a:t>15.06.2024</a:t>
             </a:fld>
             <a:endParaRPr lang="ru-RU"/>
           </a:p>
@@ -4344,7 +4389,7 @@
           <a:p>
             <a:fld id="{6D5D9A67-3DE5-459E-8D3F-A02553138B9D}" type="slidenum">
               <a:rPr lang="ru-RU" smtClean="0"/>
-              <a:t>10</a:t>
+              <a:t>11</a:t>
             </a:fld>
             <a:endParaRPr lang="ru-RU"/>
           </a:p>
@@ -4431,7 +4476,7 @@
           <a:p>
             <a:fld id="{6D5D9A67-3DE5-459E-8D3F-A02553138B9D}" type="slidenum">
               <a:rPr lang="ru-RU" smtClean="0"/>
-              <a:t>11</a:t>
+              <a:t>12</a:t>
             </a:fld>
             <a:endParaRPr lang="ru-RU"/>
           </a:p>
@@ -4550,7 +4595,7 @@
           <a:p>
             <a:fld id="{6D5D9A67-3DE5-459E-8D3F-A02553138B9D}" type="slidenum">
               <a:rPr lang="ru-RU" smtClean="0"/>
-              <a:t>12</a:t>
+              <a:t>13</a:t>
             </a:fld>
             <a:endParaRPr lang="ru-RU"/>
           </a:p>
@@ -4675,7 +4720,7 @@
           <a:p>
             <a:fld id="{6D5D9A67-3DE5-459E-8D3F-A02553138B9D}" type="slidenum">
               <a:rPr lang="ru-RU" smtClean="0"/>
-              <a:t>13</a:t>
+              <a:t>14</a:t>
             </a:fld>
             <a:endParaRPr lang="ru-RU"/>
           </a:p>
@@ -6703,7 +6748,7 @@
           <a:p>
             <a:fld id="{B2D52420-6A92-4DC2-8591-889C8603F9D7}" type="datetime1">
               <a:rPr lang="ru-RU" smtClean="0"/>
-              <a:t>31.05.2024</a:t>
+              <a:t>15.06.2024</a:t>
             </a:fld>
             <a:endParaRPr lang="ru-RU"/>
           </a:p>
@@ -6968,7 +7013,7 @@
           <a:p>
             <a:fld id="{AFC6059B-B3EB-47F3-8BC6-5CF7158CCF5E}" type="datetime1">
               <a:rPr lang="ru-RU" smtClean="0"/>
-              <a:t>31.05.2024</a:t>
+              <a:t>15.06.2024</a:t>
             </a:fld>
             <a:endParaRPr lang="ru-RU"/>
           </a:p>
@@ -7170,7 +7215,7 @@
           <a:p>
             <a:fld id="{672DA8F7-9E1C-4330-89D8-5ACAE3F4BA4B}" type="datetime1">
               <a:rPr lang="ru-RU" smtClean="0"/>
-              <a:t>31.05.2024</a:t>
+              <a:t>15.06.2024</a:t>
             </a:fld>
             <a:endParaRPr lang="ru-RU"/>
           </a:p>
@@ -7372,7 +7417,7 @@
           <a:p>
             <a:fld id="{F4997B83-498B-4930-8185-A988F003D33A}" type="datetime1">
               <a:rPr lang="ru-RU" smtClean="0"/>
-              <a:t>31.05.2024</a:t>
+              <a:t>15.06.2024</a:t>
             </a:fld>
             <a:endParaRPr lang="ru-RU"/>
           </a:p>
@@ -7665,7 +7710,7 @@
           <a:p>
             <a:fld id="{3ABD95BC-C76F-444E-B3FB-BD27E4F798B7}" type="datetime1">
               <a:rPr lang="ru-RU" smtClean="0"/>
-              <a:t>31.05.2024</a:t>
+              <a:t>15.06.2024</a:t>
             </a:fld>
             <a:endParaRPr lang="ru-RU"/>
           </a:p>
@@ -8898,7 +8943,7 @@
           <a:p>
             <a:fld id="{E13DA6AE-AB60-4652-AB2E-D952392D1655}" type="datetime1">
               <a:rPr lang="ru-RU" smtClean="0"/>
-              <a:t>31.05.2024</a:t>
+              <a:t>15.06.2024</a:t>
             </a:fld>
             <a:endParaRPr lang="ru-RU"/>
           </a:p>
@@ -9319,7 +9364,7 @@
           <a:p>
             <a:fld id="{5E0F9A4F-E2CF-4D07-BEAB-A6631996DDD1}" type="datetime1">
               <a:rPr lang="ru-RU" smtClean="0"/>
-              <a:t>31.05.2024</a:t>
+              <a:t>15.06.2024</a:t>
             </a:fld>
             <a:endParaRPr lang="ru-RU"/>
           </a:p>
@@ -9466,7 +9511,7 @@
           <a:p>
             <a:fld id="{06D2A858-6E04-484B-9C45-539F27E3937C}" type="datetime1">
               <a:rPr lang="ru-RU" smtClean="0"/>
-              <a:t>31.05.2024</a:t>
+              <a:t>15.06.2024</a:t>
             </a:fld>
             <a:endParaRPr lang="ru-RU"/>
           </a:p>
@@ -9577,7 +9622,7 @@
           <a:p>
             <a:fld id="{AC6B3F91-F2E8-4402-9B00-8213E0D61D50}" type="datetime1">
               <a:rPr lang="ru-RU" smtClean="0"/>
-              <a:t>31.05.2024</a:t>
+              <a:t>15.06.2024</a:t>
             </a:fld>
             <a:endParaRPr lang="ru-RU"/>
           </a:p>
@@ -10360,7 +10405,7 @@
           <a:p>
             <a:fld id="{50FCF844-36E3-4D2D-9EE0-8615F370CF07}" type="datetime1">
               <a:rPr lang="ru-RU" smtClean="0"/>
-              <a:t>31.05.2024</a:t>
+              <a:t>15.06.2024</a:t>
             </a:fld>
             <a:endParaRPr lang="ru-RU"/>
           </a:p>
@@ -11217,7 +11262,7 @@
           <a:p>
             <a:fld id="{8C256B46-112F-45DA-B602-9179791C6F92}" type="datetime1">
               <a:rPr lang="ru-RU" smtClean="0"/>
-              <a:t>31.05.2024</a:t>
+              <a:t>15.06.2024</a:t>
             </a:fld>
             <a:endParaRPr lang="ru-RU"/>
           </a:p>
@@ -12008,7 +12053,7 @@
           <a:p>
             <a:fld id="{629052EF-D6AA-42E2-9131-813E79594612}" type="datetimeFigureOut">
               <a:rPr lang="ru-RU" smtClean="0"/>
-              <a:t>31.05.2024</a:t>
+              <a:t>15.06.2024</a:t>
             </a:fld>
             <a:endParaRPr lang="ru-RU"/>
           </a:p>
@@ -12723,6 +12768,535 @@
           <p:cNvPr id="2" name="Заголовок 1">
             <a:extLst>
               <a:ext uri="{FF2B5EF4-FFF2-40B4-BE49-F238E27FC236}">
+                <a16:creationId xmlns:a16="http://schemas.microsoft.com/office/drawing/2014/main" id="{BB0BF0F9-DA98-8C47-0C84-327A5A33EC6A}"/>
+              </a:ext>
+            </a:extLst>
+          </p:cNvPr>
+          <p:cNvSpPr>
+            <a:spLocks noGrp="1"/>
+          </p:cNvSpPr>
+          <p:nvPr>
+            <p:ph type="title"/>
+          </p:nvPr>
+        </p:nvSpPr>
+        <p:spPr/>
+        <p:txBody>
+          <a:bodyPr/>
+          <a:lstStyle/>
+          <a:p>
+            <a:r>
+              <a:rPr lang="ru-RU" dirty="0"/>
+              <a:t>Бизнес-модель</a:t>
+            </a:r>
+          </a:p>
+        </p:txBody>
+      </p:sp>
+      <p:sp>
+        <p:nvSpPr>
+          <p:cNvPr id="3" name="Номер слайда 2">
+            <a:extLst>
+              <a:ext uri="{FF2B5EF4-FFF2-40B4-BE49-F238E27FC236}">
+                <a16:creationId xmlns:a16="http://schemas.microsoft.com/office/drawing/2014/main" id="{D4C13F68-B13E-B0F9-4C6C-94EA12E1C995}"/>
+              </a:ext>
+            </a:extLst>
+          </p:cNvPr>
+          <p:cNvSpPr>
+            <a:spLocks noGrp="1"/>
+          </p:cNvSpPr>
+          <p:nvPr>
+            <p:ph type="sldNum" sz="quarter" idx="12"/>
+          </p:nvPr>
+        </p:nvSpPr>
+        <p:spPr/>
+        <p:txBody>
+          <a:bodyPr/>
+          <a:lstStyle/>
+          <a:p>
+            <a:fld id="{172A1284-7535-4B5C-A2F7-F2F074E8B2FD}" type="slidenum">
+              <a:rPr lang="ru-RU" smtClean="0"/>
+              <a:t>10</a:t>
+            </a:fld>
+            <a:endParaRPr lang="ru-RU"/>
+          </a:p>
+        </p:txBody>
+      </p:sp>
+      <p:sp>
+        <p:nvSpPr>
+          <p:cNvPr id="4" name="TextBox 3">
+            <a:extLst>
+              <a:ext uri="{FF2B5EF4-FFF2-40B4-BE49-F238E27FC236}">
+                <a16:creationId xmlns:a16="http://schemas.microsoft.com/office/drawing/2014/main" id="{8A3484FD-8532-FA12-CA91-FE2AA5B7C0C4}"/>
+              </a:ext>
+            </a:extLst>
+          </p:cNvPr>
+          <p:cNvSpPr txBox="1"/>
+          <p:nvPr/>
+        </p:nvSpPr>
+        <p:spPr>
+          <a:xfrm>
+            <a:off x="4986476" y="2301105"/>
+            <a:ext cx="2271777" cy="2062103"/>
+          </a:xfrm>
+          <a:prstGeom prst="rect">
+            <a:avLst/>
+          </a:prstGeom>
+          <a:noFill/>
+        </p:spPr>
+        <p:txBody>
+          <a:bodyPr wrap="none" rtlCol="0">
+            <a:spAutoFit/>
+          </a:bodyPr>
+          <a:lstStyle/>
+          <a:p>
+            <a:pPr algn="ctr"/>
+            <a:r>
+              <a:rPr lang="ru-RU" sz="8800" b="1" dirty="0"/>
+              <a:t>750</a:t>
+            </a:r>
+          </a:p>
+          <a:p>
+            <a:pPr algn="ctr"/>
+            <a:r>
+              <a:rPr lang="ru-RU" sz="4000" b="1" kern="1200" dirty="0">
+                <a:solidFill>
+                  <a:schemeClr val="tx1"/>
+                </a:solidFill>
+                <a:effectLst/>
+                <a:latin typeface="+mn-lt"/>
+                <a:ea typeface="+mn-ea"/>
+                <a:cs typeface="+mn-cs"/>
+              </a:rPr>
+              <a:t>₽/месяц</a:t>
+            </a:r>
+            <a:endParaRPr lang="ru-RU" sz="4000" b="1" dirty="0"/>
+          </a:p>
+        </p:txBody>
+      </p:sp>
+      <p:grpSp>
+        <p:nvGrpSpPr>
+          <p:cNvPr id="8" name="Группа 7">
+            <a:extLst>
+              <a:ext uri="{FF2B5EF4-FFF2-40B4-BE49-F238E27FC236}">
+                <a16:creationId xmlns:a16="http://schemas.microsoft.com/office/drawing/2014/main" id="{E9E69A5A-0EA4-7C64-AC89-C098EBA631A5}"/>
+              </a:ext>
+            </a:extLst>
+          </p:cNvPr>
+          <p:cNvGrpSpPr/>
+          <p:nvPr/>
+        </p:nvGrpSpPr>
+        <p:grpSpPr>
+          <a:xfrm>
+            <a:off x="1348937" y="2377853"/>
+            <a:ext cx="1440000" cy="1980000"/>
+            <a:chOff x="1779013" y="2397949"/>
+            <a:chExt cx="1738703" cy="2560896"/>
+          </a:xfrm>
+        </p:grpSpPr>
+        <p:pic>
+          <p:nvPicPr>
+            <p:cNvPr id="6" name="Рисунок 5" descr="Сервер">
+              <a:extLst>
+                <a:ext uri="{FF2B5EF4-FFF2-40B4-BE49-F238E27FC236}">
+                  <a16:creationId xmlns:a16="http://schemas.microsoft.com/office/drawing/2014/main" id="{8C0C524F-9D74-6BD8-94AF-B4736E7C76C0}"/>
+                </a:ext>
+              </a:extLst>
+            </p:cNvPr>
+            <p:cNvPicPr>
+              <a:picLocks noChangeAspect="1"/>
+            </p:cNvPicPr>
+            <p:nvPr/>
+          </p:nvPicPr>
+          <p:blipFill>
+            <a:blip r:embed="rId2">
+              <a:extLst>
+                <a:ext uri="{28A0092B-C50C-407E-A947-70E740481C1C}">
+                  <a14:useLocalDpi xmlns:a14="http://schemas.microsoft.com/office/drawing/2010/main" val="0"/>
+                </a:ext>
+                <a:ext uri="{96DAC541-7B7A-43D3-8B79-37D633B846F1}">
+                  <asvg:svgBlip xmlns:asvg="http://schemas.microsoft.com/office/drawing/2016/SVG/main" r:embed="rId3"/>
+                </a:ext>
+              </a:extLst>
+            </a:blip>
+            <a:stretch>
+              <a:fillRect/>
+            </a:stretch>
+          </p:blipFill>
+          <p:spPr>
+            <a:xfrm>
+              <a:off x="1779013" y="2397949"/>
+              <a:ext cx="1738703" cy="2048717"/>
+            </a:xfrm>
+            <a:prstGeom prst="rect">
+              <a:avLst/>
+            </a:prstGeom>
+          </p:spPr>
+        </p:pic>
+        <p:sp>
+          <p:nvSpPr>
+            <p:cNvPr id="7" name="TextBox 6">
+              <a:extLst>
+                <a:ext uri="{FF2B5EF4-FFF2-40B4-BE49-F238E27FC236}">
+                  <a16:creationId xmlns:a16="http://schemas.microsoft.com/office/drawing/2014/main" id="{A5444077-2B73-6B52-8F96-DCB783AD9C39}"/>
+                </a:ext>
+              </a:extLst>
+            </p:cNvPr>
+            <p:cNvSpPr txBox="1"/>
+            <p:nvPr/>
+          </p:nvSpPr>
+          <p:spPr>
+            <a:xfrm>
+              <a:off x="1935034" y="4460052"/>
+              <a:ext cx="1438024" cy="498793"/>
+            </a:xfrm>
+            <a:prstGeom prst="rect">
+              <a:avLst/>
+            </a:prstGeom>
+            <a:noFill/>
+          </p:spPr>
+          <p:txBody>
+            <a:bodyPr wrap="none" rtlCol="0">
+              <a:spAutoFit/>
+            </a:bodyPr>
+            <a:lstStyle/>
+            <a:p>
+              <a:r>
+                <a:rPr lang="ru-RU" sz="2400" dirty="0"/>
+                <a:t>Хостинг</a:t>
+              </a:r>
+            </a:p>
+          </p:txBody>
+        </p:sp>
+      </p:grpSp>
+      <p:grpSp>
+        <p:nvGrpSpPr>
+          <p:cNvPr id="12" name="Группа 11">
+            <a:extLst>
+              <a:ext uri="{FF2B5EF4-FFF2-40B4-BE49-F238E27FC236}">
+                <a16:creationId xmlns:a16="http://schemas.microsoft.com/office/drawing/2014/main" id="{57FD1C21-5A97-6656-21E6-53564DB68C75}"/>
+              </a:ext>
+            </a:extLst>
+          </p:cNvPr>
+          <p:cNvGrpSpPr/>
+          <p:nvPr/>
+        </p:nvGrpSpPr>
+        <p:grpSpPr>
+          <a:xfrm>
+            <a:off x="3015387" y="3844903"/>
+            <a:ext cx="1440000" cy="1980001"/>
+            <a:chOff x="8040182" y="2516073"/>
+            <a:chExt cx="1779061" cy="2223828"/>
+          </a:xfrm>
+        </p:grpSpPr>
+        <p:pic>
+          <p:nvPicPr>
+            <p:cNvPr id="10" name="Рисунок 9" descr="Линейчатая диаграмма с тенденцией к повышению">
+              <a:extLst>
+                <a:ext uri="{FF2B5EF4-FFF2-40B4-BE49-F238E27FC236}">
+                  <a16:creationId xmlns:a16="http://schemas.microsoft.com/office/drawing/2014/main" id="{06E21B09-9710-6BDF-EDC0-DD56410554CE}"/>
+                </a:ext>
+              </a:extLst>
+            </p:cNvPr>
+            <p:cNvPicPr>
+              <a:picLocks noChangeAspect="1"/>
+            </p:cNvPicPr>
+            <p:nvPr/>
+          </p:nvPicPr>
+          <p:blipFill>
+            <a:blip r:embed="rId4">
+              <a:extLst>
+                <a:ext uri="{28A0092B-C50C-407E-A947-70E740481C1C}">
+                  <a14:useLocalDpi xmlns:a14="http://schemas.microsoft.com/office/drawing/2010/main" val="0"/>
+                </a:ext>
+                <a:ext uri="{96DAC541-7B7A-43D3-8B79-37D633B846F1}">
+                  <asvg:svgBlip xmlns:asvg="http://schemas.microsoft.com/office/drawing/2016/SVG/main" r:embed="rId5"/>
+                </a:ext>
+              </a:extLst>
+            </a:blip>
+            <a:stretch>
+              <a:fillRect/>
+            </a:stretch>
+          </p:blipFill>
+          <p:spPr>
+            <a:xfrm>
+              <a:off x="8040182" y="2516073"/>
+              <a:ext cx="1779061" cy="1779062"/>
+            </a:xfrm>
+            <a:prstGeom prst="rect">
+              <a:avLst/>
+            </a:prstGeom>
+          </p:spPr>
+        </p:pic>
+        <p:sp>
+          <p:nvSpPr>
+            <p:cNvPr id="11" name="TextBox 10">
+              <a:extLst>
+                <a:ext uri="{FF2B5EF4-FFF2-40B4-BE49-F238E27FC236}">
+                  <a16:creationId xmlns:a16="http://schemas.microsoft.com/office/drawing/2014/main" id="{DFEBBE66-E671-EF1A-AD2D-65F3801150F2}"/>
+                </a:ext>
+              </a:extLst>
+            </p:cNvPr>
+            <p:cNvSpPr txBox="1"/>
+            <p:nvPr/>
+          </p:nvSpPr>
+          <p:spPr>
+            <a:xfrm>
+              <a:off x="8097791" y="4249592"/>
+              <a:ext cx="1618300" cy="490309"/>
+            </a:xfrm>
+            <a:prstGeom prst="rect">
+              <a:avLst/>
+            </a:prstGeom>
+            <a:noFill/>
+          </p:spPr>
+          <p:txBody>
+            <a:bodyPr wrap="none" rtlCol="0">
+              <a:spAutoFit/>
+            </a:bodyPr>
+            <a:lstStyle/>
+            <a:p>
+              <a:r>
+                <a:rPr lang="ru-RU" sz="2400" dirty="0"/>
+                <a:t>Прибыль</a:t>
+              </a:r>
+              <a:endParaRPr lang="ru-RU" dirty="0"/>
+            </a:p>
+          </p:txBody>
+        </p:sp>
+      </p:grpSp>
+      <p:grpSp>
+        <p:nvGrpSpPr>
+          <p:cNvPr id="16" name="Группа 15">
+            <a:extLst>
+              <a:ext uri="{FF2B5EF4-FFF2-40B4-BE49-F238E27FC236}">
+                <a16:creationId xmlns:a16="http://schemas.microsoft.com/office/drawing/2014/main" id="{56FB0B0B-5849-AA1C-1A6C-4E3E185D31B1}"/>
+              </a:ext>
+            </a:extLst>
+          </p:cNvPr>
+          <p:cNvGrpSpPr/>
+          <p:nvPr/>
+        </p:nvGrpSpPr>
+        <p:grpSpPr>
+          <a:xfrm>
+            <a:off x="9455792" y="2377853"/>
+            <a:ext cx="1896673" cy="2283463"/>
+            <a:chOff x="8903140" y="2417756"/>
+            <a:chExt cx="1896673" cy="2283463"/>
+          </a:xfrm>
+        </p:grpSpPr>
+        <p:pic>
+          <p:nvPicPr>
+            <p:cNvPr id="14" name="Рисунок 13" descr="Открытая книга">
+              <a:extLst>
+                <a:ext uri="{FF2B5EF4-FFF2-40B4-BE49-F238E27FC236}">
+                  <a16:creationId xmlns:a16="http://schemas.microsoft.com/office/drawing/2014/main" id="{74D171FF-92A8-F792-B294-521AC9A966F3}"/>
+                </a:ext>
+              </a:extLst>
+            </p:cNvPr>
+            <p:cNvPicPr>
+              <a:picLocks noChangeAspect="1"/>
+            </p:cNvPicPr>
+            <p:nvPr/>
+          </p:nvPicPr>
+          <p:blipFill>
+            <a:blip r:embed="rId6">
+              <a:extLst>
+                <a:ext uri="{28A0092B-C50C-407E-A947-70E740481C1C}">
+                  <a14:useLocalDpi xmlns:a14="http://schemas.microsoft.com/office/drawing/2010/main" val="0"/>
+                </a:ext>
+                <a:ext uri="{96DAC541-7B7A-43D3-8B79-37D633B846F1}">
+                  <asvg:svgBlip xmlns:asvg="http://schemas.microsoft.com/office/drawing/2016/SVG/main" r:embed="rId7"/>
+                </a:ext>
+              </a:extLst>
+            </a:blip>
+            <a:stretch>
+              <a:fillRect/>
+            </a:stretch>
+          </p:blipFill>
+          <p:spPr>
+            <a:xfrm>
+              <a:off x="9131471" y="2417756"/>
+              <a:ext cx="1440000" cy="1440000"/>
+            </a:xfrm>
+            <a:prstGeom prst="rect">
+              <a:avLst/>
+            </a:prstGeom>
+          </p:spPr>
+        </p:pic>
+        <p:sp>
+          <p:nvSpPr>
+            <p:cNvPr id="15" name="TextBox 14">
+              <a:extLst>
+                <a:ext uri="{FF2B5EF4-FFF2-40B4-BE49-F238E27FC236}">
+                  <a16:creationId xmlns:a16="http://schemas.microsoft.com/office/drawing/2014/main" id="{6F1D747C-E6F0-A49C-F63C-94364A965E28}"/>
+                </a:ext>
+              </a:extLst>
+            </p:cNvPr>
+            <p:cNvSpPr txBox="1"/>
+            <p:nvPr/>
+          </p:nvSpPr>
+          <p:spPr>
+            <a:xfrm>
+              <a:off x="8903140" y="3870222"/>
+              <a:ext cx="1896673" cy="830997"/>
+            </a:xfrm>
+            <a:prstGeom prst="rect">
+              <a:avLst/>
+            </a:prstGeom>
+            <a:noFill/>
+          </p:spPr>
+          <p:txBody>
+            <a:bodyPr wrap="none" rtlCol="0">
+              <a:spAutoFit/>
+            </a:bodyPr>
+            <a:lstStyle/>
+            <a:p>
+              <a:pPr algn="ctr"/>
+              <a:r>
+                <a:rPr lang="ru-RU" sz="2400" dirty="0"/>
+                <a:t>Книга</a:t>
+              </a:r>
+            </a:p>
+            <a:p>
+              <a:pPr algn="ctr"/>
+              <a:r>
+                <a:rPr lang="ru-RU" sz="2400" dirty="0"/>
+                <a:t>резервации</a:t>
+              </a:r>
+            </a:p>
+          </p:txBody>
+        </p:sp>
+      </p:grpSp>
+      <p:grpSp>
+        <p:nvGrpSpPr>
+          <p:cNvPr id="20" name="Группа 19">
+            <a:extLst>
+              <a:ext uri="{FF2B5EF4-FFF2-40B4-BE49-F238E27FC236}">
+                <a16:creationId xmlns:a16="http://schemas.microsoft.com/office/drawing/2014/main" id="{0063C281-8B89-96E1-6D08-15354287F4C1}"/>
+              </a:ext>
+            </a:extLst>
+          </p:cNvPr>
+          <p:cNvGrpSpPr/>
+          <p:nvPr/>
+        </p:nvGrpSpPr>
+        <p:grpSpPr>
+          <a:xfrm>
+            <a:off x="7637030" y="3918333"/>
+            <a:ext cx="1601721" cy="1911713"/>
+            <a:chOff x="7415962" y="3817853"/>
+            <a:chExt cx="1601721" cy="1911713"/>
+          </a:xfrm>
+        </p:grpSpPr>
+        <p:pic>
+          <p:nvPicPr>
+            <p:cNvPr id="18" name="Рисунок 17" descr="Группа людей">
+              <a:extLst>
+                <a:ext uri="{FF2B5EF4-FFF2-40B4-BE49-F238E27FC236}">
+                  <a16:creationId xmlns:a16="http://schemas.microsoft.com/office/drawing/2014/main" id="{A406CD4D-BC4D-B3D1-4F8C-A8F9BA719B07}"/>
+                </a:ext>
+              </a:extLst>
+            </p:cNvPr>
+            <p:cNvPicPr>
+              <a:picLocks noChangeAspect="1"/>
+            </p:cNvPicPr>
+            <p:nvPr/>
+          </p:nvPicPr>
+          <p:blipFill>
+            <a:blip r:embed="rId8">
+              <a:extLst>
+                <a:ext uri="{28A0092B-C50C-407E-A947-70E740481C1C}">
+                  <a14:useLocalDpi xmlns:a14="http://schemas.microsoft.com/office/drawing/2010/main" val="0"/>
+                </a:ext>
+                <a:ext uri="{96DAC541-7B7A-43D3-8B79-37D633B846F1}">
+                  <asvg:svgBlip xmlns:asvg="http://schemas.microsoft.com/office/drawing/2016/SVG/main" r:embed="rId9"/>
+                </a:ext>
+              </a:extLst>
+            </a:blip>
+            <a:stretch>
+              <a:fillRect/>
+            </a:stretch>
+          </p:blipFill>
+          <p:spPr>
+            <a:xfrm>
+              <a:off x="7496822" y="3817853"/>
+              <a:ext cx="1440000" cy="1440000"/>
+            </a:xfrm>
+            <a:prstGeom prst="rect">
+              <a:avLst/>
+            </a:prstGeom>
+          </p:spPr>
+        </p:pic>
+        <p:sp>
+          <p:nvSpPr>
+            <p:cNvPr id="19" name="TextBox 18">
+              <a:extLst>
+                <a:ext uri="{FF2B5EF4-FFF2-40B4-BE49-F238E27FC236}">
+                  <a16:creationId xmlns:a16="http://schemas.microsoft.com/office/drawing/2014/main" id="{420BE300-47C8-8768-5EE7-D6EA35E4F55E}"/>
+                </a:ext>
+              </a:extLst>
+            </p:cNvPr>
+            <p:cNvSpPr txBox="1"/>
+            <p:nvPr/>
+          </p:nvSpPr>
+          <p:spPr>
+            <a:xfrm>
+              <a:off x="7415962" y="5267901"/>
+              <a:ext cx="1601721" cy="461665"/>
+            </a:xfrm>
+            <a:prstGeom prst="rect">
+              <a:avLst/>
+            </a:prstGeom>
+            <a:noFill/>
+          </p:spPr>
+          <p:txBody>
+            <a:bodyPr wrap="none" rtlCol="0">
+              <a:spAutoFit/>
+            </a:bodyPr>
+            <a:lstStyle/>
+            <a:p>
+              <a:r>
+                <a:rPr lang="ru-RU" sz="2400" dirty="0"/>
+                <a:t>Персонал</a:t>
+              </a:r>
+              <a:endParaRPr lang="ru-RU" dirty="0"/>
+            </a:p>
+          </p:txBody>
+        </p:sp>
+      </p:grpSp>
+    </p:spTree>
+    <p:extLst>
+      <p:ext uri="{BB962C8B-B14F-4D97-AF65-F5344CB8AC3E}">
+        <p14:creationId xmlns:p14="http://schemas.microsoft.com/office/powerpoint/2010/main" val="2743521971"/>
+      </p:ext>
+    </p:extLst>
+  </p:cSld>
+  <p:clrMapOvr>
+    <a:masterClrMapping/>
+  </p:clrMapOvr>
+</p:sld>
+</file>
+
+<file path=ppt/slides/slide11.xml><?xml version="1.0" encoding="utf-8"?>
+<p:sld xmlns:a="http://schemas.openxmlformats.org/drawingml/2006/main" xmlns:r="http://schemas.openxmlformats.org/officeDocument/2006/relationships" xmlns:p="http://schemas.openxmlformats.org/presentationml/2006/main">
+  <p:cSld>
+    <p:spTree>
+      <p:nvGrpSpPr>
+        <p:cNvPr id="1" name=""/>
+        <p:cNvGrpSpPr/>
+        <p:nvPr/>
+      </p:nvGrpSpPr>
+      <p:grpSpPr>
+        <a:xfrm>
+          <a:off x="0" y="0"/>
+          <a:ext cx="0" cy="0"/>
+          <a:chOff x="0" y="0"/>
+          <a:chExt cx="0" cy="0"/>
+        </a:xfrm>
+      </p:grpSpPr>
+      <p:sp>
+        <p:nvSpPr>
+          <p:cNvPr id="2" name="Заголовок 1">
+            <a:extLst>
+              <a:ext uri="{FF2B5EF4-FFF2-40B4-BE49-F238E27FC236}">
                 <a16:creationId xmlns:a16="http://schemas.microsoft.com/office/drawing/2014/main" id="{B6257B07-8FC0-7E9F-C49C-DADBBA4ABAD1}"/>
               </a:ext>
             </a:extLst>
@@ -12762,7 +13336,7 @@
             <p:ph idx="1"/>
             <p:extLst>
               <p:ext uri="{D42A27DB-BD31-4B8C-83A1-F6EECF244321}">
-                <p14:modId xmlns:p14="http://schemas.microsoft.com/office/powerpoint/2010/main" val="3463011179"/>
+                <p14:modId xmlns:p14="http://schemas.microsoft.com/office/powerpoint/2010/main" val="870158506"/>
               </p:ext>
             </p:extLst>
           </p:nvPr>
@@ -12778,14 +13352,14 @@
                 <a:tableStyleId>{5C22544A-7EE6-4342-B048-85BDC9FD1C3A}</a:tableStyleId>
               </a:tblPr>
               <a:tblGrid>
-                <a:gridCol w="1391666">
+                <a:gridCol w="1517650">
                   <a:extLst>
                     <a:ext uri="{9D8B030D-6E8A-4147-A177-3AD203B41FA5}">
                       <a16:colId xmlns:a16="http://schemas.microsoft.com/office/drawing/2014/main" val="519921703"/>
                     </a:ext>
                   </a:extLst>
                 </a:gridCol>
-                <a:gridCol w="1755648">
+                <a:gridCol w="1629664">
                   <a:extLst>
                     <a:ext uri="{9D8B030D-6E8A-4147-A177-3AD203B41FA5}">
                       <a16:colId xmlns:a16="http://schemas.microsoft.com/office/drawing/2014/main" val="4106884218"/>
@@ -12807,7 +13381,7 @@
                     <a:lstStyle/>
                     <a:p>
                       <a:r>
-                        <a:rPr lang="ru-RU" sz="1800" b="0" kern="1200" dirty="0" err="1">
+                        <a:rPr lang="ru-RU" sz="2000" b="0" kern="1200" dirty="0" err="1">
                           <a:solidFill>
                             <a:schemeClr val="bg1">
                               <a:lumMod val="50000"/>
@@ -12820,7 +13394,7 @@
                         </a:rPr>
                         <a:t>Restoplace</a:t>
                       </a:r>
-                      <a:endParaRPr lang="ru-RU" b="0" dirty="0">
+                      <a:endParaRPr lang="ru-RU" sz="2000" b="0" dirty="0">
                         <a:solidFill>
                           <a:schemeClr val="bg1">
                             <a:lumMod val="50000"/>
@@ -12875,7 +13449,7 @@
                     <a:lstStyle/>
                     <a:p>
                       <a:r>
-                        <a:rPr lang="en-US" sz="1800" b="0" kern="1200" dirty="0">
+                        <a:rPr lang="en-US" sz="2000" b="0" kern="1200" dirty="0">
                           <a:solidFill>
                             <a:schemeClr val="bg1">
                               <a:lumMod val="50000"/>
@@ -12889,7 +13463,7 @@
                         <a:t>1100</a:t>
                       </a:r>
                       <a:r>
-                        <a:rPr lang="ru-RU" sz="1800" b="0" kern="1200" dirty="0">
+                        <a:rPr lang="ru-RU" sz="2000" b="0" kern="1200" dirty="0">
                           <a:solidFill>
                             <a:schemeClr val="bg1">
                               <a:lumMod val="50000"/>
@@ -12903,7 +13477,7 @@
                         <a:t> ₽/</a:t>
                       </a:r>
                       <a:r>
-                        <a:rPr lang="ru-RU" sz="1800" b="0" kern="1200" dirty="0" err="1">
+                        <a:rPr lang="ru-RU" sz="2000" b="0" kern="1200" dirty="0" err="1">
                           <a:solidFill>
                             <a:schemeClr val="bg1">
                               <a:lumMod val="50000"/>
@@ -12917,7 +13491,7 @@
                         <a:t>мес</a:t>
                       </a:r>
                       <a:r>
-                        <a:rPr lang="en-US" sz="1800" b="0" kern="1200" dirty="0">
+                        <a:rPr lang="en-US" sz="2000" b="0" kern="1200" dirty="0">
                           <a:solidFill>
                             <a:schemeClr val="bg1">
                               <a:lumMod val="50000"/>
@@ -12930,7 +13504,7 @@
                         </a:rPr>
                         <a:t>.</a:t>
                       </a:r>
-                      <a:endParaRPr lang="ru-RU" b="0" dirty="0">
+                      <a:endParaRPr lang="ru-RU" sz="2000" b="0" dirty="0">
                         <a:solidFill>
                           <a:schemeClr val="bg1">
                             <a:lumMod val="50000"/>
@@ -13097,7 +13671,7 @@
                     <a:lstStyle/>
                     <a:p>
                       <a:r>
-                        <a:rPr lang="ru-RU" sz="1800" b="0" kern="1200" dirty="0" err="1">
+                        <a:rPr lang="ru-RU" sz="2000" b="0" kern="1200" dirty="0" err="1">
                           <a:solidFill>
                             <a:schemeClr val="bg1">
                               <a:lumMod val="50000"/>
@@ -13110,7 +13684,7 @@
                         </a:rPr>
                         <a:t>GuestMe</a:t>
                       </a:r>
-                      <a:endParaRPr lang="ru-RU" b="0" dirty="0">
+                      <a:endParaRPr lang="ru-RU" sz="2000" b="0" dirty="0">
                         <a:solidFill>
                           <a:schemeClr val="bg1">
                             <a:lumMod val="50000"/>
@@ -13165,7 +13739,7 @@
                     <a:lstStyle/>
                     <a:p>
                       <a:r>
-                        <a:rPr lang="ru-RU" sz="1800" b="0" kern="1200" dirty="0">
+                        <a:rPr lang="ru-RU" sz="2000" b="0" kern="1200" dirty="0">
                           <a:solidFill>
                             <a:schemeClr val="bg1">
                               <a:lumMod val="50000"/>
@@ -13178,7 +13752,7 @@
                         </a:rPr>
                         <a:t>2900 ₽/мес.</a:t>
                       </a:r>
-                      <a:endParaRPr lang="ru-RU" b="0" dirty="0">
+                      <a:endParaRPr lang="ru-RU" sz="2000" b="0" dirty="0">
                         <a:solidFill>
                           <a:schemeClr val="bg1">
                             <a:lumMod val="50000"/>
@@ -13270,7 +13844,7 @@
           <a:p>
             <a:fld id="{172A1284-7535-4B5C-A2F7-F2F074E8B2FD}" type="slidenum">
               <a:rPr lang="ru-RU" smtClean="0"/>
-              <a:t>10</a:t>
+              <a:t>11</a:t>
             </a:fld>
             <a:endParaRPr lang="ru-RU"/>
           </a:p>
@@ -13289,7 +13863,7 @@
 </p:sld>
 </file>
 
-<file path=ppt/slides/slide11.xml><?xml version="1.0" encoding="utf-8"?>
+<file path=ppt/slides/slide12.xml><?xml version="1.0" encoding="utf-8"?>
 <p:sld xmlns:a="http://schemas.openxmlformats.org/drawingml/2006/main" xmlns:r="http://schemas.openxmlformats.org/officeDocument/2006/relationships" xmlns:p="http://schemas.openxmlformats.org/presentationml/2006/main">
   <p:cSld>
     <p:spTree>
@@ -13506,7 +14080,7 @@
           <a:p>
             <a:fld id="{172A1284-7535-4B5C-A2F7-F2F074E8B2FD}" type="slidenum">
               <a:rPr lang="ru-RU" smtClean="0"/>
-              <a:t>11</a:t>
+              <a:t>12</a:t>
             </a:fld>
             <a:endParaRPr lang="ru-RU"/>
           </a:p>
@@ -13525,7 +14099,7 @@
 </p:sld>
 </file>
 
-<file path=ppt/slides/slide12.xml><?xml version="1.0" encoding="utf-8"?>
+<file path=ppt/slides/slide13.xml><?xml version="1.0" encoding="utf-8"?>
 <p:sld xmlns:a="http://schemas.openxmlformats.org/drawingml/2006/main" xmlns:r="http://schemas.openxmlformats.org/officeDocument/2006/relationships" xmlns:p="http://schemas.openxmlformats.org/presentationml/2006/main">
   <p:cSld>
     <p:spTree>
@@ -13744,7 +14318,7 @@
           <a:p>
             <a:fld id="{172A1284-7535-4B5C-A2F7-F2F074E8B2FD}" type="slidenum">
               <a:rPr lang="ru-RU" smtClean="0"/>
-              <a:t>12</a:t>
+              <a:t>13</a:t>
             </a:fld>
             <a:endParaRPr lang="ru-RU"/>
           </a:p>
@@ -13763,7 +14337,7 @@
 </p:sld>
 </file>
 
-<file path=ppt/slides/slide13.xml><?xml version="1.0" encoding="utf-8"?>
+<file path=ppt/slides/slide14.xml><?xml version="1.0" encoding="utf-8"?>
 <p:sld xmlns:a="http://schemas.openxmlformats.org/drawingml/2006/main" xmlns:r="http://schemas.openxmlformats.org/officeDocument/2006/relationships" xmlns:p="http://schemas.openxmlformats.org/presentationml/2006/main">
   <p:cSld>
     <p:spTree>
@@ -14007,7 +14581,7 @@
           <a:p>
             <a:fld id="{172A1284-7535-4B5C-A2F7-F2F074E8B2FD}" type="slidenum">
               <a:rPr lang="ru-RU" smtClean="0"/>
-              <a:t>13</a:t>
+              <a:t>14</a:t>
             </a:fld>
             <a:endParaRPr lang="ru-RU"/>
           </a:p>
@@ -14087,7 +14661,7 @@
             <p:ph idx="1"/>
             <p:extLst>
               <p:ext uri="{D42A27DB-BD31-4B8C-83A1-F6EECF244321}">
-                <p14:modId xmlns:p14="http://schemas.microsoft.com/office/powerpoint/2010/main" val="3518096977"/>
+                <p14:modId xmlns:p14="http://schemas.microsoft.com/office/powerpoint/2010/main" val="3743444800"/>
               </p:ext>
             </p:extLst>
           </p:nvPr>
@@ -14613,7 +15187,7 @@
             </a:r>
             <a:r>
               <a:rPr lang="ru-RU" sz="2400" dirty="0"/>
-              <a:t>позволяющее в реальном времени </a:t>
+              <a:t>позволяющее</a:t>
             </a:r>
           </a:p>
           <a:p>
@@ -14759,7 +15333,7 @@
           <a:lstStyle/>
           <a:p>
             <a:r>
-              <a:rPr lang="ru-RU" sz="3200" b="0" dirty="0">
+              <a:rPr lang="ru-RU" sz="2800" b="0" dirty="0">
                 <a:solidFill>
                   <a:schemeClr val="tx1"/>
                 </a:solidFill>
@@ -14967,7 +15541,7 @@
           <p:nvPr>
             <p:extLst>
               <p:ext uri="{D42A27DB-BD31-4B8C-83A1-F6EECF244321}">
-                <p14:modId xmlns:p14="http://schemas.microsoft.com/office/powerpoint/2010/main" val="397506339"/>
+                <p14:modId xmlns:p14="http://schemas.microsoft.com/office/powerpoint/2010/main" val="622198295"/>
               </p:ext>
             </p:extLst>
           </p:nvPr>

</xml_diff>

<commit_message>
doc: update presentation price slide
</commit_message>
<xml_diff>
--- a/presentation (product)/Restobook.pptx
+++ b/presentation (product)/Restobook.pptx
@@ -128,7 +128,7 @@
             <a:srgbClr val="A4A3A4"/>
           </p15:clr>
         </p15:guide>
-        <p15:guide id="2" pos="3863" userDrawn="1">
+        <p15:guide id="2" pos="3885" userDrawn="1">
           <p15:clr>
             <a:srgbClr val="A4A3A4"/>
           </p15:clr>
@@ -363,7 +363,7 @@
                   <a:bodyPr/>
                   <a:lstStyle/>
                   <a:p>
-                    <a:fld id="{29CE9A72-BCA1-4D47-8178-BF6F0E50EB10}" type="CELLRANGE">
+                    <a:fld id="{40AD1C2C-7CA6-4857-B952-F0339A14F2A1}" type="CELLRANGE">
                       <a:rPr lang="en-US"/>
                       <a:pPr/>
                       <a:t>[ДИАПАЗОН ЯЧЕЕК]</a:t>
@@ -396,7 +396,7 @@
                   <a:bodyPr/>
                   <a:lstStyle/>
                   <a:p>
-                    <a:fld id="{F1A96954-62FC-4335-9FE2-67075CADC7E5}" type="CELLRANGE">
+                    <a:fld id="{9D521DB1-2754-4778-B6FF-0145A34A325C}" type="CELLRANGE">
                       <a:rPr lang="ru-RU"/>
                       <a:pPr/>
                       <a:t>[ДИАПАЗОН ЯЧЕЕК]</a:t>
@@ -430,7 +430,7 @@
                   <a:bodyPr/>
                   <a:lstStyle/>
                   <a:p>
-                    <a:fld id="{1F073676-854C-4F05-806B-A5A717DE7FB8}" type="CELLRANGE">
+                    <a:fld id="{B297E23B-F5C3-45EC-8227-9580531525AF}" type="CELLRANGE">
                       <a:rPr lang="ru-RU"/>
                       <a:pPr/>
                       <a:t>[ДИАПАЗОН ЯЧЕЕК]</a:t>
@@ -464,7 +464,7 @@
                   <a:bodyPr/>
                   <a:lstStyle/>
                   <a:p>
-                    <a:fld id="{987F8FAB-11E2-4B1B-8F69-58931996C087}" type="CELLRANGE">
+                    <a:fld id="{F965D550-9A58-49E2-81D3-EA1FDFBC2054}" type="CELLRANGE">
                       <a:rPr lang="ru-RU"/>
                       <a:pPr/>
                       <a:t>[ДИАПАЗОН ЯЧЕЕК]</a:t>
@@ -1102,7 +1102,7 @@
                   <a:bodyPr/>
                   <a:lstStyle/>
                   <a:p>
-                    <a:fld id="{5D5AFE0A-957A-4B3E-85EA-328595241ED7}" type="CELLRANGE">
+                    <a:fld id="{046A5468-4244-4303-8E6A-B7CAE1ACA598}" type="CELLRANGE">
                       <a:rPr lang="en-US"/>
                       <a:pPr/>
                       <a:t>[ДИАПАЗОН ЯЧЕЕК]</a:t>
@@ -1135,7 +1135,7 @@
                   <a:bodyPr/>
                   <a:lstStyle/>
                   <a:p>
-                    <a:fld id="{ADDB9B6A-74D5-458E-8ABD-839C6D6A51A8}" type="CELLRANGE">
+                    <a:fld id="{28299220-61E7-4ED7-B9F0-550D01E5B4DA}" type="CELLRANGE">
                       <a:rPr lang="en-US"/>
                       <a:pPr/>
                       <a:t>[ДИАПАЗОН ЯЧЕЕК]</a:t>
@@ -1168,7 +1168,7 @@
                   <a:bodyPr/>
                   <a:lstStyle/>
                   <a:p>
-                    <a:fld id="{17534AE4-2F9F-43A6-87C6-5137C366C476}" type="CELLRANGE">
+                    <a:fld id="{6EB261E9-344C-478F-912A-C338F793960D}" type="CELLRANGE">
                       <a:rPr lang="ru-RU"/>
                       <a:pPr/>
                       <a:t>[ДИАПАЗОН ЯЧЕЕК]</a:t>
@@ -1202,7 +1202,7 @@
                   <a:bodyPr/>
                   <a:lstStyle/>
                   <a:p>
-                    <a:fld id="{8FF336F7-3945-4045-8724-E84514A12B8E}" type="CELLRANGE">
+                    <a:fld id="{DD5F1F1E-F877-4BEC-AC24-DF934F122943}" type="CELLRANGE">
                       <a:rPr lang="ru-RU"/>
                       <a:pPr/>
                       <a:t>[ДИАПАЗОН ЯЧЕЕК]</a:t>
@@ -1835,7 +1835,7 @@
                   <a:bodyPr/>
                   <a:lstStyle/>
                   <a:p>
-                    <a:fld id="{08F9CB16-8726-4C54-825D-10244AF655E1}" type="CELLRANGE">
+                    <a:fld id="{8E63D05E-6254-44E4-A114-884719236CF0}" type="CELLRANGE">
                       <a:rPr lang="en-US"/>
                       <a:pPr/>
                       <a:t>[ДИАПАЗОН ЯЧЕЕК]</a:t>
@@ -1868,7 +1868,7 @@
                   <a:bodyPr/>
                   <a:lstStyle/>
                   <a:p>
-                    <a:fld id="{6C548B92-34BF-41AA-A84A-E4C299DD4772}" type="CELLRANGE">
+                    <a:fld id="{8FE9AEC9-B5FF-4C8E-951F-635FE6D79765}" type="CELLRANGE">
                       <a:rPr lang="ru-RU"/>
                       <a:pPr/>
                       <a:t>[ДИАПАЗОН ЯЧЕЕК]</a:t>
@@ -3958,7 +3958,7 @@
           <a:p>
             <a:fld id="{90ABE644-5DA6-4F42-9056-5E70F70D6CF2}" type="datetimeFigureOut">
               <a:rPr lang="ru-RU" smtClean="0"/>
-              <a:t>15.06.2024</a:t>
+              <a:t>16.06.2024</a:t>
             </a:fld>
             <a:endParaRPr lang="ru-RU"/>
           </a:p>
@@ -6748,7 +6748,7 @@
           <a:p>
             <a:fld id="{B2D52420-6A92-4DC2-8591-889C8603F9D7}" type="datetime1">
               <a:rPr lang="ru-RU" smtClean="0"/>
-              <a:t>15.06.2024</a:t>
+              <a:t>16.06.2024</a:t>
             </a:fld>
             <a:endParaRPr lang="ru-RU"/>
           </a:p>
@@ -7013,7 +7013,7 @@
           <a:p>
             <a:fld id="{AFC6059B-B3EB-47F3-8BC6-5CF7158CCF5E}" type="datetime1">
               <a:rPr lang="ru-RU" smtClean="0"/>
-              <a:t>15.06.2024</a:t>
+              <a:t>16.06.2024</a:t>
             </a:fld>
             <a:endParaRPr lang="ru-RU"/>
           </a:p>
@@ -7215,7 +7215,7 @@
           <a:p>
             <a:fld id="{672DA8F7-9E1C-4330-89D8-5ACAE3F4BA4B}" type="datetime1">
               <a:rPr lang="ru-RU" smtClean="0"/>
-              <a:t>15.06.2024</a:t>
+              <a:t>16.06.2024</a:t>
             </a:fld>
             <a:endParaRPr lang="ru-RU"/>
           </a:p>
@@ -7417,7 +7417,7 @@
           <a:p>
             <a:fld id="{F4997B83-498B-4930-8185-A988F003D33A}" type="datetime1">
               <a:rPr lang="ru-RU" smtClean="0"/>
-              <a:t>15.06.2024</a:t>
+              <a:t>16.06.2024</a:t>
             </a:fld>
             <a:endParaRPr lang="ru-RU"/>
           </a:p>
@@ -7710,7 +7710,7 @@
           <a:p>
             <a:fld id="{3ABD95BC-C76F-444E-B3FB-BD27E4F798B7}" type="datetime1">
               <a:rPr lang="ru-RU" smtClean="0"/>
-              <a:t>15.06.2024</a:t>
+              <a:t>16.06.2024</a:t>
             </a:fld>
             <a:endParaRPr lang="ru-RU"/>
           </a:p>
@@ -8943,7 +8943,7 @@
           <a:p>
             <a:fld id="{E13DA6AE-AB60-4652-AB2E-D952392D1655}" type="datetime1">
               <a:rPr lang="ru-RU" smtClean="0"/>
-              <a:t>15.06.2024</a:t>
+              <a:t>16.06.2024</a:t>
             </a:fld>
             <a:endParaRPr lang="ru-RU"/>
           </a:p>
@@ -9364,7 +9364,7 @@
           <a:p>
             <a:fld id="{5E0F9A4F-E2CF-4D07-BEAB-A6631996DDD1}" type="datetime1">
               <a:rPr lang="ru-RU" smtClean="0"/>
-              <a:t>15.06.2024</a:t>
+              <a:t>16.06.2024</a:t>
             </a:fld>
             <a:endParaRPr lang="ru-RU"/>
           </a:p>
@@ -9511,7 +9511,7 @@
           <a:p>
             <a:fld id="{06D2A858-6E04-484B-9C45-539F27E3937C}" type="datetime1">
               <a:rPr lang="ru-RU" smtClean="0"/>
-              <a:t>15.06.2024</a:t>
+              <a:t>16.06.2024</a:t>
             </a:fld>
             <a:endParaRPr lang="ru-RU"/>
           </a:p>
@@ -9622,7 +9622,7 @@
           <a:p>
             <a:fld id="{AC6B3F91-F2E8-4402-9B00-8213E0D61D50}" type="datetime1">
               <a:rPr lang="ru-RU" smtClean="0"/>
-              <a:t>15.06.2024</a:t>
+              <a:t>16.06.2024</a:t>
             </a:fld>
             <a:endParaRPr lang="ru-RU"/>
           </a:p>
@@ -10405,7 +10405,7 @@
           <a:p>
             <a:fld id="{50FCF844-36E3-4D2D-9EE0-8615F370CF07}" type="datetime1">
               <a:rPr lang="ru-RU" smtClean="0"/>
-              <a:t>15.06.2024</a:t>
+              <a:t>16.06.2024</a:t>
             </a:fld>
             <a:endParaRPr lang="ru-RU"/>
           </a:p>
@@ -11262,7 +11262,7 @@
           <a:p>
             <a:fld id="{8C256B46-112F-45DA-B602-9179791C6F92}" type="datetime1">
               <a:rPr lang="ru-RU" smtClean="0"/>
-              <a:t>15.06.2024</a:t>
+              <a:t>16.06.2024</a:t>
             </a:fld>
             <a:endParaRPr lang="ru-RU"/>
           </a:p>
@@ -12053,7 +12053,7 @@
           <a:p>
             <a:fld id="{629052EF-D6AA-42E2-9131-813E79594612}" type="datetimeFigureOut">
               <a:rPr lang="ru-RU" smtClean="0"/>
-              <a:t>15.06.2024</a:t>
+              <a:t>16.06.2024</a:t>
             </a:fld>
             <a:endParaRPr lang="ru-RU"/>
           </a:p>
@@ -12886,7 +12886,7 @@
         </p:nvGrpSpPr>
         <p:grpSpPr>
           <a:xfrm>
-            <a:off x="1348937" y="2377853"/>
+            <a:off x="1376233" y="2418797"/>
             <a:ext cx="1440000" cy="1980000"/>
             <a:chOff x="1779013" y="2397949"/>
             <a:chExt cx="1738703" cy="2560896"/>
@@ -12924,7 +12924,7 @@
           <p:spPr>
             <a:xfrm>
               <a:off x="1779013" y="2397949"/>
-              <a:ext cx="1738703" cy="2048717"/>
+              <a:ext cx="1738703" cy="2048716"/>
             </a:xfrm>
             <a:prstGeom prst="rect">
               <a:avLst/>
@@ -12946,7 +12946,7 @@
           <p:spPr>
             <a:xfrm>
               <a:off x="1935034" y="4460052"/>
-              <a:ext cx="1438024" cy="498793"/>
+              <a:ext cx="1438025" cy="498793"/>
             </a:xfrm>
             <a:prstGeom prst="rect">
               <a:avLst/>
@@ -12981,9 +12981,9 @@
         </p:nvGrpSpPr>
         <p:grpSpPr>
           <a:xfrm>
-            <a:off x="3015387" y="3844903"/>
+            <a:off x="3042683" y="3817607"/>
             <a:ext cx="1440000" cy="1980001"/>
-            <a:chOff x="8040182" y="2516073"/>
+            <a:chOff x="8040181" y="2516073"/>
             <a:chExt cx="1779061" cy="2223828"/>
           </a:xfrm>
         </p:grpSpPr>
@@ -13018,7 +13018,7 @@
           </p:blipFill>
           <p:spPr>
             <a:xfrm>
-              <a:off x="8040182" y="2516073"/>
+              <a:off x="8040181" y="2516073"/>
               <a:ext cx="1779061" cy="1779062"/>
             </a:xfrm>
             <a:prstGeom prst="rect">
@@ -13040,7 +13040,7 @@
           </p:nvSpPr>
           <p:spPr>
             <a:xfrm>
-              <a:off x="8097791" y="4249592"/>
+              <a:off x="8097788" y="4249592"/>
               <a:ext cx="1618300" cy="490309"/>
             </a:xfrm>
             <a:prstGeom prst="rect">
@@ -13077,7 +13077,7 @@
         </p:nvGrpSpPr>
         <p:grpSpPr>
           <a:xfrm>
-            <a:off x="9455792" y="2377853"/>
+            <a:off x="9428496" y="2418797"/>
             <a:ext cx="1896673" cy="2283463"/>
             <a:chOff x="8903140" y="2417756"/>
             <a:chExt cx="1896673" cy="2283463"/>
@@ -13180,7 +13180,7 @@
         </p:nvGrpSpPr>
         <p:grpSpPr>
           <a:xfrm>
-            <a:off x="7637030" y="3918333"/>
+            <a:off x="7596086" y="3891037"/>
             <a:ext cx="1601721" cy="1911713"/>
             <a:chOff x="7415962" y="3817853"/>
             <a:chExt cx="1601721" cy="1911713"/>

</xml_diff>